<commit_message>
slides con presentacion personal
</commit_message>
<xml_diff>
--- a/ppt/Diapositivas v2.pptx
+++ b/ppt/Diapositivas v2.pptx
@@ -5,30 +5,32 @@
     <p:sldMasterId id="2147483696" r:id="rId1"/>
   </p:sldMasterIdLst>
   <p:notesMasterIdLst>
-    <p:notesMasterId r:id="rId23"/>
+    <p:notesMasterId r:id="rId25"/>
   </p:notesMasterIdLst>
   <p:sldIdLst>
     <p:sldId id="256" r:id="rId2"/>
-    <p:sldId id="476" r:id="rId3"/>
-    <p:sldId id="460" r:id="rId4"/>
-    <p:sldId id="461" r:id="rId5"/>
-    <p:sldId id="448" r:id="rId6"/>
-    <p:sldId id="449" r:id="rId7"/>
-    <p:sldId id="464" r:id="rId8"/>
-    <p:sldId id="463" r:id="rId9"/>
-    <p:sldId id="473" r:id="rId10"/>
-    <p:sldId id="478" r:id="rId11"/>
-    <p:sldId id="479" r:id="rId12"/>
-    <p:sldId id="462" r:id="rId13"/>
-    <p:sldId id="450" r:id="rId14"/>
-    <p:sldId id="456" r:id="rId15"/>
-    <p:sldId id="469" r:id="rId16"/>
-    <p:sldId id="453" r:id="rId17"/>
-    <p:sldId id="466" r:id="rId18"/>
-    <p:sldId id="465" r:id="rId19"/>
-    <p:sldId id="470" r:id="rId20"/>
-    <p:sldId id="477" r:id="rId21"/>
-    <p:sldId id="475" r:id="rId22"/>
+    <p:sldId id="480" r:id="rId3"/>
+    <p:sldId id="476" r:id="rId4"/>
+    <p:sldId id="460" r:id="rId5"/>
+    <p:sldId id="461" r:id="rId6"/>
+    <p:sldId id="448" r:id="rId7"/>
+    <p:sldId id="449" r:id="rId8"/>
+    <p:sldId id="464" r:id="rId9"/>
+    <p:sldId id="463" r:id="rId10"/>
+    <p:sldId id="484" r:id="rId11"/>
+    <p:sldId id="473" r:id="rId12"/>
+    <p:sldId id="478" r:id="rId13"/>
+    <p:sldId id="462" r:id="rId14"/>
+    <p:sldId id="450" r:id="rId15"/>
+    <p:sldId id="479" r:id="rId16"/>
+    <p:sldId id="456" r:id="rId17"/>
+    <p:sldId id="469" r:id="rId18"/>
+    <p:sldId id="453" r:id="rId19"/>
+    <p:sldId id="466" r:id="rId20"/>
+    <p:sldId id="465" r:id="rId21"/>
+    <p:sldId id="470" r:id="rId22"/>
+    <p:sldId id="477" r:id="rId23"/>
+    <p:sldId id="475" r:id="rId24"/>
   </p:sldIdLst>
   <p:sldSz cx="9144000" cy="6858000" type="screen4x3"/>
   <p:notesSz cx="6858000" cy="9144000"/>
@@ -3031,7 +3033,7 @@
           <a:p>
             <a:fld id="{63D5FC4C-9EE1-4746-A368-724F618FC790}" type="datetimeFigureOut">
               <a:rPr lang="es-PE" smtClean="0"/>
-              <a:t>10/22/14</a:t>
+              <a:t>10/24/14</a:t>
             </a:fld>
             <a:endParaRPr lang="es-PE"/>
           </a:p>
@@ -3448,7 +3450,7 @@
           <a:p>
             <a:fld id="{96DE5A63-0F1F-4DC0-ADE0-CC17EBA6F230}" type="slidenum">
               <a:rPr lang="es-PE" smtClean="0"/>
-              <a:t>10</a:t>
+              <a:t>11</a:t>
             </a:fld>
             <a:endParaRPr lang="es-PE"/>
           </a:p>
@@ -3532,7 +3534,7 @@
           <a:p>
             <a:fld id="{96DE5A63-0F1F-4DC0-ADE0-CC17EBA6F230}" type="slidenum">
               <a:rPr lang="es-PE" smtClean="0"/>
-              <a:t>11</a:t>
+              <a:t>12</a:t>
             </a:fld>
             <a:endParaRPr lang="es-PE"/>
           </a:p>
@@ -3616,7 +3618,7 @@
           <a:p>
             <a:fld id="{96DE5A63-0F1F-4DC0-ADE0-CC17EBA6F230}" type="slidenum">
               <a:rPr lang="es-PE" smtClean="0"/>
-              <a:t>12</a:t>
+              <a:t>13</a:t>
             </a:fld>
             <a:endParaRPr lang="es-PE"/>
           </a:p>
@@ -3704,7 +3706,7 @@
           <a:p>
             <a:fld id="{96DE5A63-0F1F-4DC0-ADE0-CC17EBA6F230}" type="slidenum">
               <a:rPr lang="es-PE" smtClean="0"/>
-              <a:t>13</a:t>
+              <a:t>14</a:t>
             </a:fld>
             <a:endParaRPr lang="es-PE"/>
           </a:p>
@@ -3788,7 +3790,7 @@
           <a:p>
             <a:fld id="{96DE5A63-0F1F-4DC0-ADE0-CC17EBA6F230}" type="slidenum">
               <a:rPr lang="es-PE" smtClean="0"/>
-              <a:t>14</a:t>
+              <a:t>15</a:t>
             </a:fld>
             <a:endParaRPr lang="es-PE"/>
           </a:p>
@@ -3797,7 +3799,7 @@
     </p:spTree>
     <p:extLst>
       <p:ext uri="{BB962C8B-B14F-4D97-AF65-F5344CB8AC3E}">
-        <p14:creationId xmlns:p14="http://schemas.microsoft.com/office/powerpoint/2010/main" val="1461112982"/>
+        <p14:creationId xmlns:p14="http://schemas.microsoft.com/office/powerpoint/2010/main" val="3614550747"/>
       </p:ext>
     </p:extLst>
   </p:cSld>
@@ -3851,7 +3853,64 @@
           <a:bodyPr/>
           <a:lstStyle/>
           <a:p>
-            <a:endParaRPr lang="es-PE" dirty="0"/>
+            <a:pPr marL="114300" lvl="1" indent="0" defTabSz="914400">
+              <a:buFont typeface="Arial"/>
+              <a:buNone/>
+            </a:pPr>
+            <a:r>
+              <a:rPr lang="es-PE" sz="3200" dirty="0" smtClean="0"/>
+              <a:t>Extract Method</a:t>
+            </a:r>
+          </a:p>
+          <a:p>
+            <a:pPr marL="114300" lvl="1" indent="0" defTabSz="914400">
+              <a:buFont typeface="Arial"/>
+              <a:buNone/>
+            </a:pPr>
+            <a:r>
+              <a:rPr lang="es-PE" sz="3200" dirty="0" smtClean="0"/>
+              <a:t>Extract Variable</a:t>
+            </a:r>
+          </a:p>
+          <a:p>
+            <a:pPr marL="114300" lvl="1" indent="0" defTabSz="914400">
+              <a:buFont typeface="Arial"/>
+              <a:buNone/>
+            </a:pPr>
+            <a:r>
+              <a:rPr lang="es-PE" sz="3200" dirty="0" smtClean="0"/>
+              <a:t>Inline Variable (opcional Inline Method)</a:t>
+            </a:r>
+            <a:endParaRPr lang="es-PE" sz="1200" dirty="0"/>
+          </a:p>
+          <a:p>
+            <a:pPr marL="114300" lvl="1" indent="0" defTabSz="914400">
+              <a:buFont typeface="Arial"/>
+              <a:buNone/>
+            </a:pPr>
+            <a:r>
+              <a:rPr lang="es-PE" sz="1200" dirty="0" smtClean="0"/>
+              <a:t>Move</a:t>
+            </a:r>
+            <a:r>
+              <a:rPr lang="es-PE" sz="1200" baseline="0" dirty="0" smtClean="0"/>
+              <a:t> Method</a:t>
+            </a:r>
+          </a:p>
+          <a:p>
+            <a:pPr marL="114300" lvl="1" indent="0" defTabSz="914400">
+              <a:buFont typeface="Arial"/>
+              <a:buNone/>
+            </a:pPr>
+            <a:r>
+              <a:rPr lang="es-PE" sz="1200" baseline="0" smtClean="0"/>
+              <a:t>(Opcional) Edici</a:t>
+            </a:r>
+            <a:r>
+              <a:rPr lang="es-PE" sz="1200" baseline="0" smtClean="0"/>
+              <a:t>ón de código</a:t>
+            </a:r>
+            <a:endParaRPr lang="es-PE" sz="3200" dirty="0" smtClean="0"/>
           </a:p>
         </p:txBody>
       </p:sp>
@@ -3872,7 +3931,7 @@
           <a:p>
             <a:fld id="{96DE5A63-0F1F-4DC0-ADE0-CC17EBA6F230}" type="slidenum">
               <a:rPr lang="es-PE" smtClean="0"/>
-              <a:t>15</a:t>
+              <a:t>16</a:t>
             </a:fld>
             <a:endParaRPr lang="es-PE"/>
           </a:p>
@@ -3935,113 +3994,6 @@
           <a:bodyPr/>
           <a:lstStyle/>
           <a:p>
-            <a:pPr algn="l"/>
-            <a:r>
-              <a:rPr lang="es-PE" sz="1200" i="1" dirty="0" smtClean="0"/>
-              <a:t>Existe un gran catálogo de </a:t>
-            </a:r>
-            <a:r>
-              <a:rPr lang="es-PE" sz="1200" i="1" dirty="0" err="1" smtClean="0"/>
-              <a:t>refactorings</a:t>
-            </a:r>
-            <a:r>
-              <a:rPr lang="es-PE" sz="1200" i="1" baseline="0" dirty="0" smtClean="0"/>
-              <a:t> y la meta es tratar de practicar la mayor cantidad </a:t>
-            </a:r>
-            <a:endParaRPr lang="es-PE" sz="1200" i="1" dirty="0" smtClean="0"/>
-          </a:p>
-          <a:p>
-            <a:pPr algn="l"/>
-            <a:r>
-              <a:rPr lang="es-PE" sz="1200" i="1" dirty="0" smtClean="0"/>
-              <a:t>(</a:t>
-            </a:r>
-            <a:r>
-              <a:rPr lang="es-PE" sz="1200" i="1" dirty="0" err="1" smtClean="0"/>
-              <a:t>Move</a:t>
-            </a:r>
-            <a:r>
-              <a:rPr lang="es-PE" sz="1200" i="1" dirty="0" smtClean="0"/>
-              <a:t> </a:t>
-            </a:r>
-            <a:r>
-              <a:rPr lang="es-PE" sz="1200" i="1" dirty="0" err="1" smtClean="0"/>
-              <a:t>Method</a:t>
-            </a:r>
-            <a:r>
-              <a:rPr lang="es-PE" sz="1200" i="1" dirty="0" smtClean="0"/>
-              <a:t>, </a:t>
-            </a:r>
-            <a:r>
-              <a:rPr lang="es-PE" sz="1200" i="1" dirty="0" err="1" smtClean="0"/>
-              <a:t>Inline</a:t>
-            </a:r>
-            <a:r>
-              <a:rPr lang="es-PE" sz="1200" i="1" dirty="0" smtClean="0"/>
-              <a:t> </a:t>
-            </a:r>
-            <a:r>
-              <a:rPr lang="es-PE" sz="1200" i="1" dirty="0" err="1" smtClean="0"/>
-              <a:t>Method</a:t>
-            </a:r>
-            <a:r>
-              <a:rPr lang="es-PE" sz="1200" i="1" dirty="0" smtClean="0"/>
-              <a:t>, </a:t>
-            </a:r>
-            <a:r>
-              <a:rPr lang="es-PE" sz="1200" i="1" dirty="0" err="1" smtClean="0"/>
-              <a:t>Extract</a:t>
-            </a:r>
-            <a:r>
-              <a:rPr lang="es-PE" sz="1200" i="1" dirty="0" smtClean="0"/>
-              <a:t> Interface, </a:t>
-            </a:r>
-          </a:p>
-          <a:p>
-            <a:pPr algn="l"/>
-            <a:r>
-              <a:rPr lang="es-PE" sz="1200" i="1" dirty="0" err="1" smtClean="0"/>
-              <a:t>Replace</a:t>
-            </a:r>
-            <a:r>
-              <a:rPr lang="es-PE" sz="1200" i="1" dirty="0" smtClean="0"/>
-              <a:t> </a:t>
-            </a:r>
-            <a:r>
-              <a:rPr lang="es-PE" sz="1200" i="1" dirty="0" err="1" smtClean="0"/>
-              <a:t>Conditional</a:t>
-            </a:r>
-            <a:r>
-              <a:rPr lang="es-PE" sz="1200" i="1" dirty="0" smtClean="0"/>
-              <a:t> </a:t>
-            </a:r>
-            <a:r>
-              <a:rPr lang="es-PE" sz="1200" i="1" dirty="0" err="1" smtClean="0"/>
-              <a:t>with</a:t>
-            </a:r>
-            <a:r>
-              <a:rPr lang="es-PE" sz="1200" i="1" dirty="0" smtClean="0"/>
-              <a:t> </a:t>
-            </a:r>
-            <a:r>
-              <a:rPr lang="es-PE" sz="1200" i="1" dirty="0" err="1" smtClean="0"/>
-              <a:t>Polymorphism</a:t>
-            </a:r>
-            <a:r>
-              <a:rPr lang="es-PE" sz="1200" i="1" dirty="0" smtClean="0"/>
-              <a:t>, </a:t>
-            </a:r>
-            <a:r>
-              <a:rPr lang="es-PE" sz="1200" i="1" dirty="0" err="1" smtClean="0"/>
-              <a:t>etc</a:t>
-            </a:r>
-            <a:r>
-              <a:rPr lang="es-PE" sz="1200" i="1" dirty="0" smtClean="0"/>
-              <a:t>)</a:t>
-            </a:r>
-          </a:p>
-          <a:p>
-            <a:pPr algn="l"/>
             <a:endParaRPr lang="es-PE" dirty="0"/>
           </a:p>
         </p:txBody>
@@ -4063,7 +4015,7 @@
           <a:p>
             <a:fld id="{96DE5A63-0F1F-4DC0-ADE0-CC17EBA6F230}" type="slidenum">
               <a:rPr lang="es-PE" smtClean="0"/>
-              <a:t>16</a:t>
+              <a:t>17</a:t>
             </a:fld>
             <a:endParaRPr lang="es-PE"/>
           </a:p>
@@ -4072,7 +4024,7 @@
     </p:spTree>
     <p:extLst>
       <p:ext uri="{BB962C8B-B14F-4D97-AF65-F5344CB8AC3E}">
-        <p14:creationId xmlns:p14="http://schemas.microsoft.com/office/powerpoint/2010/main" val="3614550747"/>
+        <p14:creationId xmlns:p14="http://schemas.microsoft.com/office/powerpoint/2010/main" val="1461112982"/>
       </p:ext>
     </p:extLst>
   </p:cSld>
@@ -4254,7 +4206,7 @@
           <a:p>
             <a:fld id="{96DE5A63-0F1F-4DC0-ADE0-CC17EBA6F230}" type="slidenum">
               <a:rPr lang="es-PE" smtClean="0"/>
-              <a:t>17</a:t>
+              <a:t>18</a:t>
             </a:fld>
             <a:endParaRPr lang="es-PE"/>
           </a:p>
@@ -4318,6 +4270,112 @@
           <a:lstStyle/>
           <a:p>
             <a:pPr algn="l"/>
+            <a:r>
+              <a:rPr lang="es-PE" sz="1200" i="1" dirty="0" smtClean="0"/>
+              <a:t>Existe un gran catálogo de </a:t>
+            </a:r>
+            <a:r>
+              <a:rPr lang="es-PE" sz="1200" i="1" dirty="0" err="1" smtClean="0"/>
+              <a:t>refactorings</a:t>
+            </a:r>
+            <a:r>
+              <a:rPr lang="es-PE" sz="1200" i="1" baseline="0" dirty="0" smtClean="0"/>
+              <a:t> y la meta es tratar de practicar la mayor cantidad </a:t>
+            </a:r>
+            <a:endParaRPr lang="es-PE" sz="1200" i="1" dirty="0" smtClean="0"/>
+          </a:p>
+          <a:p>
+            <a:pPr algn="l"/>
+            <a:r>
+              <a:rPr lang="es-PE" sz="1200" i="1" dirty="0" smtClean="0"/>
+              <a:t>(</a:t>
+            </a:r>
+            <a:r>
+              <a:rPr lang="es-PE" sz="1200" i="1" dirty="0" err="1" smtClean="0"/>
+              <a:t>Move</a:t>
+            </a:r>
+            <a:r>
+              <a:rPr lang="es-PE" sz="1200" i="1" dirty="0" smtClean="0"/>
+              <a:t> </a:t>
+            </a:r>
+            <a:r>
+              <a:rPr lang="es-PE" sz="1200" i="1" dirty="0" err="1" smtClean="0"/>
+              <a:t>Method</a:t>
+            </a:r>
+            <a:r>
+              <a:rPr lang="es-PE" sz="1200" i="1" dirty="0" smtClean="0"/>
+              <a:t>, </a:t>
+            </a:r>
+            <a:r>
+              <a:rPr lang="es-PE" sz="1200" i="1" dirty="0" err="1" smtClean="0"/>
+              <a:t>Inline</a:t>
+            </a:r>
+            <a:r>
+              <a:rPr lang="es-PE" sz="1200" i="1" dirty="0" smtClean="0"/>
+              <a:t> </a:t>
+            </a:r>
+            <a:r>
+              <a:rPr lang="es-PE" sz="1200" i="1" dirty="0" err="1" smtClean="0"/>
+              <a:t>Method</a:t>
+            </a:r>
+            <a:r>
+              <a:rPr lang="es-PE" sz="1200" i="1" dirty="0" smtClean="0"/>
+              <a:t>, </a:t>
+            </a:r>
+            <a:r>
+              <a:rPr lang="es-PE" sz="1200" i="1" dirty="0" err="1" smtClean="0"/>
+              <a:t>Extract</a:t>
+            </a:r>
+            <a:r>
+              <a:rPr lang="es-PE" sz="1200" i="1" dirty="0" smtClean="0"/>
+              <a:t> Interface, </a:t>
+            </a:r>
+          </a:p>
+          <a:p>
+            <a:pPr algn="l"/>
+            <a:r>
+              <a:rPr lang="es-PE" sz="1200" i="1" dirty="0" err="1" smtClean="0"/>
+              <a:t>Replace</a:t>
+            </a:r>
+            <a:r>
+              <a:rPr lang="es-PE" sz="1200" i="1" dirty="0" smtClean="0"/>
+              <a:t> </a:t>
+            </a:r>
+            <a:r>
+              <a:rPr lang="es-PE" sz="1200" i="1" dirty="0" err="1" smtClean="0"/>
+              <a:t>Conditional</a:t>
+            </a:r>
+            <a:r>
+              <a:rPr lang="es-PE" sz="1200" i="1" dirty="0" smtClean="0"/>
+              <a:t> </a:t>
+            </a:r>
+            <a:r>
+              <a:rPr lang="es-PE" sz="1200" i="1" dirty="0" err="1" smtClean="0"/>
+              <a:t>with</a:t>
+            </a:r>
+            <a:r>
+              <a:rPr lang="es-PE" sz="1200" i="1" dirty="0" smtClean="0"/>
+              <a:t> </a:t>
+            </a:r>
+            <a:r>
+              <a:rPr lang="es-PE" sz="1200" i="1" dirty="0" err="1" smtClean="0"/>
+              <a:t>Polymorphism</a:t>
+            </a:r>
+            <a:r>
+              <a:rPr lang="es-PE" sz="1200" i="1" dirty="0" smtClean="0"/>
+              <a:t>, </a:t>
+            </a:r>
+            <a:r>
+              <a:rPr lang="es-PE" sz="1200" i="1" dirty="0" err="1" smtClean="0"/>
+              <a:t>etc</a:t>
+            </a:r>
+            <a:r>
+              <a:rPr lang="es-PE" sz="1200" i="1" dirty="0" smtClean="0"/>
+              <a:t>)</a:t>
+            </a:r>
+          </a:p>
+          <a:p>
+            <a:pPr algn="l"/>
             <a:endParaRPr lang="es-PE" dirty="0"/>
           </a:p>
         </p:txBody>
@@ -4339,7 +4397,7 @@
           <a:p>
             <a:fld id="{96DE5A63-0F1F-4DC0-ADE0-CC17EBA6F230}" type="slidenum">
               <a:rPr lang="es-PE" smtClean="0"/>
-              <a:t>18</a:t>
+              <a:t>19</a:t>
             </a:fld>
             <a:endParaRPr lang="es-PE"/>
           </a:p>
@@ -4424,7 +4482,7 @@
           <a:p>
             <a:fld id="{96DE5A63-0F1F-4DC0-ADE0-CC17EBA6F230}" type="slidenum">
               <a:rPr lang="es-PE" smtClean="0"/>
-              <a:t>19</a:t>
+              <a:t>20</a:t>
             </a:fld>
             <a:endParaRPr lang="es-PE"/>
           </a:p>
@@ -4526,7 +4584,7 @@
           <a:p>
             <a:fld id="{96DE5A63-0F1F-4DC0-ADE0-CC17EBA6F230}" type="slidenum">
               <a:rPr lang="es-PE" smtClean="0"/>
-              <a:t>2</a:t>
+              <a:t>3</a:t>
             </a:fld>
             <a:endParaRPr lang="es-PE"/>
           </a:p>
@@ -4611,7 +4669,7 @@
           <a:p>
             <a:fld id="{96DE5A63-0F1F-4DC0-ADE0-CC17EBA6F230}" type="slidenum">
               <a:rPr lang="es-PE" smtClean="0"/>
-              <a:t>20</a:t>
+              <a:t>21</a:t>
             </a:fld>
             <a:endParaRPr lang="es-PE"/>
           </a:p>
@@ -4696,7 +4754,92 @@
           <a:p>
             <a:fld id="{96DE5A63-0F1F-4DC0-ADE0-CC17EBA6F230}" type="slidenum">
               <a:rPr lang="es-PE" smtClean="0"/>
-              <a:t>21</a:t>
+              <a:t>22</a:t>
+            </a:fld>
+            <a:endParaRPr lang="es-PE"/>
+          </a:p>
+        </p:txBody>
+      </p:sp>
+    </p:spTree>
+    <p:extLst>
+      <p:ext uri="{BB962C8B-B14F-4D97-AF65-F5344CB8AC3E}">
+        <p14:creationId xmlns:p14="http://schemas.microsoft.com/office/powerpoint/2010/main" val="3614550747"/>
+      </p:ext>
+    </p:extLst>
+  </p:cSld>
+  <p:clrMapOvr>
+    <a:masterClrMapping/>
+  </p:clrMapOvr>
+</p:notes>
+</file>
+
+<file path=ppt/notesSlides/notesSlide22.xml><?xml version="1.0" encoding="utf-8"?>
+<p:notes xmlns:a="http://schemas.openxmlformats.org/drawingml/2006/main" xmlns:r="http://schemas.openxmlformats.org/officeDocument/2006/relationships" xmlns:p="http://schemas.openxmlformats.org/presentationml/2006/main">
+  <p:cSld>
+    <p:spTree>
+      <p:nvGrpSpPr>
+        <p:cNvPr id="1" name=""/>
+        <p:cNvGrpSpPr/>
+        <p:nvPr/>
+      </p:nvGrpSpPr>
+      <p:grpSpPr>
+        <a:xfrm>
+          <a:off x="0" y="0"/>
+          <a:ext cx="0" cy="0"/>
+          <a:chOff x="0" y="0"/>
+          <a:chExt cx="0" cy="0"/>
+        </a:xfrm>
+      </p:grpSpPr>
+      <p:sp>
+        <p:nvSpPr>
+          <p:cNvPr id="2" name="1 Marcador de imagen de diapositiva"/>
+          <p:cNvSpPr>
+            <a:spLocks noGrp="1" noRot="1" noChangeAspect="1"/>
+          </p:cNvSpPr>
+          <p:nvPr>
+            <p:ph type="sldImg"/>
+          </p:nvPr>
+        </p:nvSpPr>
+        <p:spPr/>
+      </p:sp>
+      <p:sp>
+        <p:nvSpPr>
+          <p:cNvPr id="3" name="2 Marcador de notas"/>
+          <p:cNvSpPr>
+            <a:spLocks noGrp="1"/>
+          </p:cNvSpPr>
+          <p:nvPr>
+            <p:ph type="body" idx="1"/>
+          </p:nvPr>
+        </p:nvSpPr>
+        <p:spPr/>
+        <p:txBody>
+          <a:bodyPr/>
+          <a:lstStyle/>
+          <a:p>
+            <a:pPr algn="l"/>
+            <a:endParaRPr lang="es-PE" dirty="0"/>
+          </a:p>
+        </p:txBody>
+      </p:sp>
+      <p:sp>
+        <p:nvSpPr>
+          <p:cNvPr id="4" name="3 Marcador de número de diapositiva"/>
+          <p:cNvSpPr>
+            <a:spLocks noGrp="1"/>
+          </p:cNvSpPr>
+          <p:nvPr>
+            <p:ph type="sldNum" sz="quarter" idx="10"/>
+          </p:nvPr>
+        </p:nvSpPr>
+        <p:spPr/>
+        <p:txBody>
+          <a:bodyPr/>
+          <a:lstStyle/>
+          <a:p>
+            <a:fld id="{96DE5A63-0F1F-4DC0-ADE0-CC17EBA6F230}" type="slidenum">
+              <a:rPr lang="es-PE" smtClean="0"/>
+              <a:t>23</a:t>
             </a:fld>
             <a:endParaRPr lang="es-PE"/>
           </a:p>
@@ -4798,7 +4941,7 @@
           <a:p>
             <a:fld id="{96DE5A63-0F1F-4DC0-ADE0-CC17EBA6F230}" type="slidenum">
               <a:rPr lang="es-PE" smtClean="0"/>
-              <a:t>3</a:t>
+              <a:t>4</a:t>
             </a:fld>
             <a:endParaRPr lang="es-PE"/>
           </a:p>
@@ -4900,7 +5043,7 @@
           <a:p>
             <a:fld id="{96DE5A63-0F1F-4DC0-ADE0-CC17EBA6F230}" type="slidenum">
               <a:rPr lang="es-PE" smtClean="0"/>
-              <a:t>4</a:t>
+              <a:t>5</a:t>
             </a:fld>
             <a:endParaRPr lang="es-PE"/>
           </a:p>
@@ -4988,7 +5131,7 @@
           <a:p>
             <a:fld id="{96DE5A63-0F1F-4DC0-ADE0-CC17EBA6F230}" type="slidenum">
               <a:rPr lang="es-PE" smtClean="0"/>
-              <a:t>5</a:t>
+              <a:t>6</a:t>
             </a:fld>
             <a:endParaRPr lang="es-PE"/>
           </a:p>
@@ -5117,7 +5260,7 @@
           <a:p>
             <a:fld id="{96DE5A63-0F1F-4DC0-ADE0-CC17EBA6F230}" type="slidenum">
               <a:rPr lang="es-PE" smtClean="0"/>
-              <a:t>6</a:t>
+              <a:t>7</a:t>
             </a:fld>
             <a:endParaRPr lang="es-PE"/>
           </a:p>
@@ -5201,7 +5344,7 @@
           <a:p>
             <a:fld id="{96DE5A63-0F1F-4DC0-ADE0-CC17EBA6F230}" type="slidenum">
               <a:rPr lang="es-PE" smtClean="0"/>
-              <a:t>7</a:t>
+              <a:t>8</a:t>
             </a:fld>
             <a:endParaRPr lang="es-PE"/>
           </a:p>
@@ -5285,7 +5428,7 @@
           <a:p>
             <a:fld id="{96DE5A63-0F1F-4DC0-ADE0-CC17EBA6F230}" type="slidenum">
               <a:rPr lang="es-PE" smtClean="0"/>
-              <a:t>8</a:t>
+              <a:t>9</a:t>
             </a:fld>
             <a:endParaRPr lang="es-PE"/>
           </a:p>
@@ -5369,7 +5512,7 @@
           <a:p>
             <a:fld id="{96DE5A63-0F1F-4DC0-ADE0-CC17EBA6F230}" type="slidenum">
               <a:rPr lang="es-PE" smtClean="0"/>
-              <a:t>9</a:t>
+              <a:t>10</a:t>
             </a:fld>
             <a:endParaRPr lang="es-PE"/>
           </a:p>
@@ -5570,7 +5713,7 @@
             <a:fld id="{807CB568-C05F-482F-9F26-AA302B8892DF}" type="datetimeFigureOut">
               <a:rPr lang="es-ES" smtClean="0"/>
               <a:pPr/>
-              <a:t>10/22/14</a:t>
+              <a:t>10/24/14</a:t>
             </a:fld>
             <a:endParaRPr lang="es-ES"/>
           </a:p>
@@ -5742,7 +5885,7 @@
             <a:fld id="{807CB568-C05F-482F-9F26-AA302B8892DF}" type="datetimeFigureOut">
               <a:rPr lang="es-ES" smtClean="0"/>
               <a:pPr/>
-              <a:t>10/22/14</a:t>
+              <a:t>10/24/14</a:t>
             </a:fld>
             <a:endParaRPr lang="es-ES"/>
           </a:p>
@@ -5924,7 +6067,7 @@
             <a:fld id="{807CB568-C05F-482F-9F26-AA302B8892DF}" type="datetimeFigureOut">
               <a:rPr lang="es-ES" smtClean="0"/>
               <a:pPr/>
-              <a:t>10/22/14</a:t>
+              <a:t>10/24/14</a:t>
             </a:fld>
             <a:endParaRPr lang="es-ES"/>
           </a:p>
@@ -6096,7 +6239,7 @@
             <a:fld id="{807CB568-C05F-482F-9F26-AA302B8892DF}" type="datetimeFigureOut">
               <a:rPr lang="es-ES" smtClean="0"/>
               <a:pPr/>
-              <a:t>10/22/14</a:t>
+              <a:t>10/24/14</a:t>
             </a:fld>
             <a:endParaRPr lang="es-ES"/>
           </a:p>
@@ -6344,7 +6487,7 @@
             <a:fld id="{807CB568-C05F-482F-9F26-AA302B8892DF}" type="datetimeFigureOut">
               <a:rPr lang="es-ES" smtClean="0"/>
               <a:pPr/>
-              <a:t>10/22/14</a:t>
+              <a:t>10/24/14</a:t>
             </a:fld>
             <a:endParaRPr lang="es-ES"/>
           </a:p>
@@ -6634,7 +6777,7 @@
             <a:fld id="{807CB568-C05F-482F-9F26-AA302B8892DF}" type="datetimeFigureOut">
               <a:rPr lang="es-ES" smtClean="0"/>
               <a:pPr/>
-              <a:t>10/22/14</a:t>
+              <a:t>10/24/14</a:t>
             </a:fld>
             <a:endParaRPr lang="es-ES"/>
           </a:p>
@@ -7058,7 +7201,7 @@
             <a:fld id="{807CB568-C05F-482F-9F26-AA302B8892DF}" type="datetimeFigureOut">
               <a:rPr lang="es-ES" smtClean="0"/>
               <a:pPr/>
-              <a:t>10/22/14</a:t>
+              <a:t>10/24/14</a:t>
             </a:fld>
             <a:endParaRPr lang="es-ES"/>
           </a:p>
@@ -7178,7 +7321,7 @@
             <a:fld id="{807CB568-C05F-482F-9F26-AA302B8892DF}" type="datetimeFigureOut">
               <a:rPr lang="es-ES" smtClean="0"/>
               <a:pPr/>
-              <a:t>10/22/14</a:t>
+              <a:t>10/24/14</a:t>
             </a:fld>
             <a:endParaRPr lang="es-ES"/>
           </a:p>
@@ -7275,7 +7418,7 @@
             <a:fld id="{807CB568-C05F-482F-9F26-AA302B8892DF}" type="datetimeFigureOut">
               <a:rPr lang="es-ES" smtClean="0"/>
               <a:pPr/>
-              <a:t>10/22/14</a:t>
+              <a:t>10/24/14</a:t>
             </a:fld>
             <a:endParaRPr lang="es-ES"/>
           </a:p>
@@ -7554,7 +7697,7 @@
             <a:fld id="{807CB568-C05F-482F-9F26-AA302B8892DF}" type="datetimeFigureOut">
               <a:rPr lang="es-ES" smtClean="0"/>
               <a:pPr/>
-              <a:t>10/22/14</a:t>
+              <a:t>10/24/14</a:t>
             </a:fld>
             <a:endParaRPr lang="es-ES"/>
           </a:p>
@@ -7809,7 +7952,7 @@
             <a:fld id="{807CB568-C05F-482F-9F26-AA302B8892DF}" type="datetimeFigureOut">
               <a:rPr lang="es-ES" smtClean="0"/>
               <a:pPr/>
-              <a:t>10/22/14</a:t>
+              <a:t>10/24/14</a:t>
             </a:fld>
             <a:endParaRPr lang="es-ES"/>
           </a:p>
@@ -8024,7 +8167,7 @@
             <a:fld id="{807CB568-C05F-482F-9F26-AA302B8892DF}" type="datetimeFigureOut">
               <a:rPr lang="es-ES" smtClean="0"/>
               <a:pPr/>
-              <a:t>10/22/14</a:t>
+              <a:t>10/24/14</a:t>
             </a:fld>
             <a:endParaRPr lang="es-ES"/>
           </a:p>
@@ -8706,7 +8849,7 @@
                   <a:srgbClr val="FF0000"/>
                 </a:solidFill>
               </a:rPr>
-              <a:t>Puntaje</a:t>
+              <a:t>Actividades por Hoyo</a:t>
             </a:r>
             <a:endParaRPr lang="es-PE" dirty="0">
               <a:solidFill>
@@ -8728,8 +8871,8 @@
         </p:nvSpPr>
         <p:spPr>
           <a:xfrm>
-            <a:off x="251520" y="1052736"/>
-            <a:ext cx="8712968" cy="3323987"/>
+            <a:off x="539552" y="1109996"/>
+            <a:ext cx="8352928" cy="4339650"/>
           </a:xfrm>
           <a:prstGeom prst="rect">
             <a:avLst/>
@@ -8741,52 +8884,69 @@
           </a:bodyPr>
           <a:lstStyle/>
           <a:p>
-            <a:pPr algn="ctr"/>
-            <a:r>
-              <a:rPr lang="es-PE" sz="3500" dirty="0">
-                <a:solidFill>
-                  <a:srgbClr val="00823B"/>
-                </a:solidFill>
-              </a:rPr>
-              <a:t>Penalidades</a:t>
-            </a:r>
-          </a:p>
-          <a:p>
-            <a:r>
-              <a:rPr lang="es-PE" sz="3500" dirty="0"/>
-              <a:t>+2 Cada línea modificada </a:t>
-            </a:r>
-            <a:r>
-              <a:rPr lang="es-PE" sz="3500" dirty="0" smtClean="0"/>
-              <a:t>manualmente</a:t>
-            </a:r>
-          </a:p>
-          <a:p>
-            <a:r>
-              <a:rPr lang="es-PE" sz="3500" dirty="0" smtClean="0"/>
-              <a:t>x2 Cada cambio mientras </a:t>
-            </a:r>
-            <a:r>
-              <a:rPr lang="es-PE" sz="3500" dirty="0"/>
-              <a:t>no </a:t>
-            </a:r>
-            <a:r>
-              <a:rPr lang="es-PE" sz="3500" dirty="0" smtClean="0"/>
-              <a:t>compile</a:t>
-            </a:r>
-          </a:p>
-          <a:p>
-            <a:r>
-              <a:rPr lang="es-PE" sz="3500" dirty="0" smtClean="0"/>
-              <a:t>X3 Cada cambio mientras no pasen las pruebas</a:t>
-            </a:r>
-          </a:p>
-          <a:p>
-            <a:r>
-              <a:rPr lang="es-PE" sz="3500" dirty="0" smtClean="0"/>
-              <a:t>+999 Si las pruebas no pasan al terminar el hoyo</a:t>
-            </a:r>
-            <a:endParaRPr lang="es-PE" sz="3500" dirty="0" smtClean="0"/>
+            <a:pPr marL="571500" indent="-571500">
+              <a:buFont typeface="Arial"/>
+              <a:buChar char="•"/>
+            </a:pPr>
+            <a:r>
+              <a:rPr lang="es-PE" sz="3600" dirty="0" smtClean="0"/>
+              <a:t>Calentamiento (5 min)</a:t>
+            </a:r>
+          </a:p>
+          <a:p>
+            <a:r>
+              <a:rPr lang="es-PE" sz="3200" dirty="0" smtClean="0"/>
+              <a:t>Pr</a:t>
+            </a:r>
+            <a:r>
+              <a:rPr lang="es-PE" sz="3200" dirty="0" smtClean="0"/>
+              <a:t>ácticar previamente solo los refactorings necesarios para el juego.</a:t>
+            </a:r>
+          </a:p>
+          <a:p>
+            <a:endParaRPr lang="es-PE" sz="3600" dirty="0" smtClean="0"/>
+          </a:p>
+          <a:p>
+            <a:pPr marL="571500" indent="-571500">
+              <a:buFont typeface="Arial"/>
+              <a:buChar char="•"/>
+            </a:pPr>
+            <a:r>
+              <a:rPr lang="es-PE" sz="3600" dirty="0" smtClean="0"/>
+              <a:t>Juego (10 minutos)</a:t>
+            </a:r>
+          </a:p>
+          <a:p>
+            <a:pPr marL="571500" indent="-571500">
+              <a:buFont typeface="Arial"/>
+              <a:buChar char="•"/>
+            </a:pPr>
+            <a:endParaRPr lang="es-PE" sz="3600" dirty="0"/>
+          </a:p>
+          <a:p>
+            <a:pPr marL="571500" indent="-571500">
+              <a:buFont typeface="Arial"/>
+              <a:buChar char="•"/>
+            </a:pPr>
+            <a:r>
+              <a:rPr lang="es-PE" sz="3600" dirty="0" smtClean="0"/>
+              <a:t>Discusi</a:t>
+            </a:r>
+            <a:r>
+              <a:rPr lang="es-PE" sz="3600" dirty="0" smtClean="0"/>
+              <a:t>ón</a:t>
+            </a:r>
+            <a:r>
+              <a:rPr lang="es-PE" sz="3600" dirty="0" smtClean="0"/>
+              <a:t> (2 minutos)</a:t>
+            </a:r>
+          </a:p>
+          <a:p>
+            <a:r>
+              <a:rPr lang="es-PE" sz="3200" dirty="0" smtClean="0"/>
+              <a:t>Que hemos aprendido de jugar el hoyo.</a:t>
+            </a:r>
+            <a:endParaRPr lang="es-PE" sz="3200" dirty="0" smtClean="0"/>
           </a:p>
         </p:txBody>
       </p:sp>
@@ -8796,7 +8956,7 @@
     </p:custDataLst>
     <p:extLst>
       <p:ext uri="{BB962C8B-B14F-4D97-AF65-F5344CB8AC3E}">
-        <p14:creationId xmlns:p14="http://schemas.microsoft.com/office/powerpoint/2010/main" val="2044733697"/>
+        <p14:creationId xmlns:p14="http://schemas.microsoft.com/office/powerpoint/2010/main" val="2627210013"/>
       </p:ext>
     </p:extLst>
   </p:cSld>
@@ -8845,14 +9005,12 @@
         </p:nvSpPr>
         <p:spPr>
           <a:xfrm>
-            <a:off x="457200" y="332656"/>
-            <a:ext cx="8229600" cy="1224136"/>
+            <a:off x="457200" y="160885"/>
+            <a:ext cx="8229600" cy="792088"/>
           </a:xfrm>
         </p:spPr>
         <p:txBody>
-          <a:bodyPr>
-            <a:normAutofit fontScale="90000"/>
-          </a:bodyPr>
+          <a:bodyPr/>
           <a:lstStyle/>
           <a:p>
             <a:r>
@@ -8861,30 +9019,7 @@
                   <a:srgbClr val="FF0000"/>
                 </a:solidFill>
               </a:rPr>
-              <a:t>C</a:t>
-            </a:r>
-            <a:r>
-              <a:rPr lang="es-PE" dirty="0" smtClean="0">
-                <a:solidFill>
-                  <a:srgbClr val="FF0000"/>
-                </a:solidFill>
-              </a:rPr>
-              <a:t>ómo triunfar en este desafío </a:t>
-            </a:r>
-            <a:br>
-              <a:rPr lang="es-PE" dirty="0" smtClean="0">
-                <a:solidFill>
-                  <a:srgbClr val="FF0000"/>
-                </a:solidFill>
-              </a:rPr>
-            </a:br>
-            <a:r>
-              <a:rPr lang="es-PE" dirty="0" smtClean="0">
-                <a:solidFill>
-                  <a:srgbClr val="FF0000"/>
-                </a:solidFill>
-              </a:rPr>
-              <a:t>(y en Refactoring)?</a:t>
+              <a:t>Puntaje</a:t>
             </a:r>
             <a:endParaRPr lang="es-PE" dirty="0">
               <a:solidFill>
@@ -8894,32 +9029,10 @@
           </a:p>
         </p:txBody>
       </p:sp>
-      <p:graphicFrame>
-        <p:nvGraphicFramePr>
-          <p:cNvPr id="4" name="12 Diagrama"/>
-          <p:cNvGraphicFramePr/>
-          <p:nvPr>
-            <p:extLst>
-              <p:ext uri="{D42A27DB-BD31-4B8C-83A1-F6EECF244321}">
-                <p14:modId xmlns:p14="http://schemas.microsoft.com/office/powerpoint/2010/main" val="469313183"/>
-              </p:ext>
-            </p:extLst>
-          </p:nvPr>
-        </p:nvGraphicFramePr>
-        <p:xfrm>
-          <a:off x="656531" y="3861048"/>
-          <a:ext cx="8163941" cy="1020680"/>
-        </p:xfrm>
-        <a:graphic>
-          <a:graphicData uri="http://schemas.openxmlformats.org/drawingml/2006/diagram">
-            <dgm:relIds xmlns:dgm="http://schemas.openxmlformats.org/drawingml/2006/diagram" xmlns:r="http://schemas.openxmlformats.org/officeDocument/2006/relationships" r:dm="rId6" r:lo="rId7" r:qs="rId8" r:cs="rId9"/>
-          </a:graphicData>
-        </a:graphic>
-      </p:graphicFrame>
-      <p:sp>
-        <p:nvSpPr>
-          <p:cNvPr id="5" name="2 Rectángulo"/>
-          <p:cNvSpPr/>
+      <p:sp>
+        <p:nvSpPr>
+          <p:cNvPr id="2" name="1 CuadroTexto"/>
+          <p:cNvSpPr txBox="1"/>
           <p:nvPr>
             <p:custDataLst>
               <p:tags r:id="rId3"/>
@@ -8928,39 +9041,116 @@
         </p:nvSpPr>
         <p:spPr>
           <a:xfrm>
-            <a:off x="395536" y="2187441"/>
-            <a:ext cx="8280920" cy="1169551"/>
+            <a:off x="251520" y="879224"/>
+            <a:ext cx="8712968" cy="4939814"/>
           </a:xfrm>
           <a:prstGeom prst="rect">
             <a:avLst/>
           </a:prstGeom>
+          <a:noFill/>
         </p:spPr>
         <p:txBody>
-          <a:bodyPr wrap="square">
+          <a:bodyPr wrap="square" rtlCol="0">
             <a:spAutoFit/>
           </a:bodyPr>
           <a:lstStyle/>
           <a:p>
-            <a:pPr marL="457200" indent="-457200">
-              <a:buFont typeface="Arial"/>
-              <a:buChar char="•"/>
-            </a:pPr>
+            <a:pPr algn="ctr"/>
+            <a:r>
+              <a:rPr lang="es-PE" sz="3500" dirty="0" smtClean="0">
+                <a:solidFill>
+                  <a:srgbClr val="00823B"/>
+                </a:solidFill>
+              </a:rPr>
+              <a:t>General</a:t>
+            </a:r>
+          </a:p>
+          <a:p>
             <a:r>
               <a:rPr lang="es-PE" sz="3500" dirty="0" smtClean="0"/>
-              <a:t>Baby Steps</a:t>
-            </a:r>
-            <a:endParaRPr lang="es-PE" sz="3500" dirty="0" smtClean="0"/>
-          </a:p>
-          <a:p>
-            <a:pPr marL="457200" indent="-457200">
-              <a:buFont typeface="Arial"/>
-              <a:buChar char="•"/>
-            </a:pPr>
+              <a:t>+</a:t>
+            </a:r>
+            <a:r>
+              <a:rPr lang="es-PE" sz="3500" dirty="0"/>
+              <a:t>1 </a:t>
+            </a:r>
             <a:r>
               <a:rPr lang="es-PE" sz="3500" dirty="0" smtClean="0"/>
-              <a:t>Ejecutar las pruebas constantemente</a:t>
-            </a:r>
-            <a:endParaRPr lang="es-PE" sz="3500" dirty="0" smtClean="0"/>
+              <a:t>Cada refactorización</a:t>
+            </a:r>
+          </a:p>
+          <a:p>
+            <a:r>
+              <a:rPr lang="es-PE" sz="3500" dirty="0" smtClean="0"/>
+              <a:t>+</a:t>
+            </a:r>
+            <a:r>
+              <a:rPr lang="es-PE" sz="3500" dirty="0"/>
+              <a:t>1 Copiar + </a:t>
+            </a:r>
+            <a:r>
+              <a:rPr lang="es-PE" sz="3500" dirty="0" smtClean="0"/>
+              <a:t>Pegar</a:t>
+            </a:r>
+          </a:p>
+          <a:p>
+            <a:r>
+              <a:rPr lang="es-PE" sz="3500" dirty="0"/>
+              <a:t>+1 </a:t>
+            </a:r>
+            <a:r>
+              <a:rPr lang="es-PE" sz="3500" dirty="0" smtClean="0"/>
+              <a:t>Cualquier shortcut </a:t>
+            </a:r>
+            <a:r>
+              <a:rPr lang="es-PE" sz="3500" dirty="0"/>
+              <a:t>de edición </a:t>
+            </a:r>
+            <a:r>
+              <a:rPr lang="es-PE" sz="3500" dirty="0" smtClean="0"/>
+              <a:t>código</a:t>
+            </a:r>
+          </a:p>
+          <a:p>
+            <a:r>
+              <a:rPr lang="es-PE" sz="3500" dirty="0" smtClean="0"/>
+              <a:t>+1 Eliminar una línea con código</a:t>
+            </a:r>
+          </a:p>
+          <a:p>
+            <a:r>
+              <a:rPr lang="es-PE" sz="3500" dirty="0" smtClean="0"/>
+              <a:t>+1 Crear clases, interfaces o variables</a:t>
+            </a:r>
+          </a:p>
+          <a:p>
+            <a:pPr marL="633413" indent="-633413"/>
+            <a:r>
+              <a:rPr lang="es-PE" sz="3500" dirty="0" smtClean="0"/>
+              <a:t>+</a:t>
+            </a:r>
+            <a:r>
+              <a:rPr lang="es-PE" sz="3500" dirty="0"/>
+              <a:t>0 </a:t>
+            </a:r>
+            <a:r>
+              <a:rPr lang="es-PE" sz="3500" dirty="0" smtClean="0"/>
+              <a:t>Dar formato o eliminar líneas en blanco</a:t>
+            </a:r>
+          </a:p>
+          <a:p>
+            <a:pPr marL="633413" indent="-633413"/>
+            <a:r>
+              <a:rPr lang="es-PE" sz="3500" dirty="0" smtClean="0"/>
+              <a:t>+0 Cambiar el acceso de los métodos o clases</a:t>
+            </a:r>
+          </a:p>
+          <a:p>
+            <a:pPr marL="633413" indent="-633413"/>
+            <a:r>
+              <a:rPr lang="es-PE" sz="3500" dirty="0" smtClean="0"/>
+              <a:t>+0 Cambiar un método a estático y viceversa</a:t>
+            </a:r>
           </a:p>
         </p:txBody>
       </p:sp>
@@ -8970,7 +9160,7 @@
     </p:custDataLst>
     <p:extLst>
       <p:ext uri="{BB962C8B-B14F-4D97-AF65-F5344CB8AC3E}">
-        <p14:creationId xmlns:p14="http://schemas.microsoft.com/office/powerpoint/2010/main" val="1682063905"/>
+        <p14:creationId xmlns:p14="http://schemas.microsoft.com/office/powerpoint/2010/main" val="1848309971"/>
       </p:ext>
     </p:extLst>
   </p:cSld>
@@ -9033,6 +9223,158 @@
                   <a:srgbClr val="FF0000"/>
                 </a:solidFill>
               </a:rPr>
+              <a:t>Puntaje</a:t>
+            </a:r>
+            <a:endParaRPr lang="es-PE" dirty="0">
+              <a:solidFill>
+                <a:srgbClr val="FF0000"/>
+              </a:solidFill>
+            </a:endParaRPr>
+          </a:p>
+        </p:txBody>
+      </p:sp>
+      <p:sp>
+        <p:nvSpPr>
+          <p:cNvPr id="3" name="2 Rectángulo"/>
+          <p:cNvSpPr/>
+          <p:nvPr>
+            <p:custDataLst>
+              <p:tags r:id="rId3"/>
+            </p:custDataLst>
+          </p:nvPr>
+        </p:nvSpPr>
+        <p:spPr>
+          <a:xfrm>
+            <a:off x="251520" y="1052736"/>
+            <a:ext cx="8712968" cy="3323987"/>
+          </a:xfrm>
+          <a:prstGeom prst="rect">
+            <a:avLst/>
+          </a:prstGeom>
+        </p:spPr>
+        <p:txBody>
+          <a:bodyPr wrap="square">
+            <a:spAutoFit/>
+          </a:bodyPr>
+          <a:lstStyle/>
+          <a:p>
+            <a:pPr algn="ctr"/>
+            <a:r>
+              <a:rPr lang="es-PE" sz="3500" dirty="0">
+                <a:solidFill>
+                  <a:srgbClr val="00823B"/>
+                </a:solidFill>
+              </a:rPr>
+              <a:t>Penalidades</a:t>
+            </a:r>
+          </a:p>
+          <a:p>
+            <a:r>
+              <a:rPr lang="es-PE" sz="3500" dirty="0"/>
+              <a:t>+2 Cada línea modificada </a:t>
+            </a:r>
+            <a:r>
+              <a:rPr lang="es-PE" sz="3500" dirty="0" smtClean="0"/>
+              <a:t>manualmente</a:t>
+            </a:r>
+          </a:p>
+          <a:p>
+            <a:r>
+              <a:rPr lang="es-PE" sz="3500" dirty="0" smtClean="0"/>
+              <a:t>x2 Cada cambio mientras </a:t>
+            </a:r>
+            <a:r>
+              <a:rPr lang="es-PE" sz="3500" dirty="0"/>
+              <a:t>no </a:t>
+            </a:r>
+            <a:r>
+              <a:rPr lang="es-PE" sz="3500" dirty="0" smtClean="0"/>
+              <a:t>compile</a:t>
+            </a:r>
+          </a:p>
+          <a:p>
+            <a:r>
+              <a:rPr lang="es-PE" sz="3500" dirty="0" smtClean="0"/>
+              <a:t>X3 Cada cambio mientras no pasen las pruebas</a:t>
+            </a:r>
+          </a:p>
+          <a:p>
+            <a:r>
+              <a:rPr lang="es-PE" sz="3500" dirty="0" smtClean="0"/>
+              <a:t>+999 Si las pruebas no pasan al terminar el hoyo</a:t>
+            </a:r>
+          </a:p>
+        </p:txBody>
+      </p:sp>
+    </p:spTree>
+    <p:custDataLst>
+      <p:tags r:id="rId1"/>
+    </p:custDataLst>
+    <p:extLst>
+      <p:ext uri="{BB962C8B-B14F-4D97-AF65-F5344CB8AC3E}">
+        <p14:creationId xmlns:p14="http://schemas.microsoft.com/office/powerpoint/2010/main" val="2044733697"/>
+      </p:ext>
+    </p:extLst>
+  </p:cSld>
+  <p:clrMapOvr>
+    <a:masterClrMapping/>
+  </p:clrMapOvr>
+  <p:timing>
+    <p:tnLst>
+      <p:par>
+        <p:cTn xmlns:p14="http://schemas.microsoft.com/office/powerpoint/2010/main" id="1" dur="indefinite" restart="never" nodeType="tmRoot"/>
+      </p:par>
+    </p:tnLst>
+  </p:timing>
+</p:sld>
+</file>
+
+<file path=ppt/slides/slide13.xml><?xml version="1.0" encoding="utf-8"?>
+<p:sld xmlns:a="http://schemas.openxmlformats.org/drawingml/2006/main" xmlns:r="http://schemas.openxmlformats.org/officeDocument/2006/relationships" xmlns:p="http://schemas.openxmlformats.org/presentationml/2006/main">
+  <p:cSld>
+    <p:spTree>
+      <p:nvGrpSpPr>
+        <p:cNvPr id="1" name=""/>
+        <p:cNvGrpSpPr/>
+        <p:nvPr/>
+      </p:nvGrpSpPr>
+      <p:grpSpPr>
+        <a:xfrm>
+          <a:off x="0" y="0"/>
+          <a:ext cx="0" cy="0"/>
+          <a:chOff x="0" y="0"/>
+          <a:chExt cx="0" cy="0"/>
+        </a:xfrm>
+      </p:grpSpPr>
+      <p:sp>
+        <p:nvSpPr>
+          <p:cNvPr id="18" name="1 Título"/>
+          <p:cNvSpPr>
+            <a:spLocks noGrp="1"/>
+          </p:cNvSpPr>
+          <p:nvPr>
+            <p:ph type="title"/>
+            <p:custDataLst>
+              <p:tags r:id="rId2"/>
+            </p:custDataLst>
+          </p:nvPr>
+        </p:nvSpPr>
+        <p:spPr>
+          <a:xfrm>
+            <a:off x="457200" y="160885"/>
+            <a:ext cx="8229600" cy="792088"/>
+          </a:xfrm>
+        </p:spPr>
+        <p:txBody>
+          <a:bodyPr/>
+          <a:lstStyle/>
+          <a:p>
+            <a:r>
+              <a:rPr lang="es-PE" dirty="0" smtClean="0">
+                <a:solidFill>
+                  <a:srgbClr val="FF0000"/>
+                </a:solidFill>
+              </a:rPr>
               <a:t>Equipo Ganador</a:t>
             </a:r>
             <a:endParaRPr lang="es-PE" dirty="0">
@@ -9111,7 +9453,7 @@
 </p:sld>
 </file>
 
-<file path=ppt/slides/slide13.xml><?xml version="1.0" encoding="utf-8"?>
+<file path=ppt/slides/slide14.xml><?xml version="1.0" encoding="utf-8"?>
 <p:sld xmlns:a="http://schemas.openxmlformats.org/drawingml/2006/main" xmlns:r="http://schemas.openxmlformats.org/officeDocument/2006/relationships" xmlns:p="http://schemas.openxmlformats.org/presentationml/2006/main">
   <p:cSld>
     <p:spTree>
@@ -9259,121 +9601,6 @@
 </p:sld>
 </file>
 
-<file path=ppt/slides/slide14.xml><?xml version="1.0" encoding="utf-8"?>
-<p:sld xmlns:a="http://schemas.openxmlformats.org/drawingml/2006/main" xmlns:r="http://schemas.openxmlformats.org/officeDocument/2006/relationships" xmlns:p="http://schemas.openxmlformats.org/presentationml/2006/main">
-  <p:cSld>
-    <p:spTree>
-      <p:nvGrpSpPr>
-        <p:cNvPr id="1" name=""/>
-        <p:cNvGrpSpPr/>
-        <p:nvPr/>
-      </p:nvGrpSpPr>
-      <p:grpSpPr>
-        <a:xfrm>
-          <a:off x="0" y="0"/>
-          <a:ext cx="0" cy="0"/>
-          <a:chOff x="0" y="0"/>
-          <a:chExt cx="0" cy="0"/>
-        </a:xfrm>
-      </p:grpSpPr>
-      <p:pic>
-        <p:nvPicPr>
-          <p:cNvPr id="4" name="3 Imagen"/>
-          <p:cNvPicPr>
-            <a:picLocks noChangeAspect="1"/>
-          </p:cNvPicPr>
-          <p:nvPr>
-            <p:custDataLst>
-              <p:tags r:id="rId2"/>
-            </p:custDataLst>
-          </p:nvPr>
-        </p:nvPicPr>
-        <p:blipFill>
-          <a:blip r:embed="rId6" cstate="print">
-            <a:extLst>
-              <a:ext uri="{28A0092B-C50C-407E-A947-70E740481C1C}">
-                <a14:useLocalDpi xmlns:a14="http://schemas.microsoft.com/office/drawing/2010/main"/>
-              </a:ext>
-            </a:extLst>
-          </a:blip>
-          <a:stretch>
-            <a:fillRect/>
-          </a:stretch>
-        </p:blipFill>
-        <p:spPr>
-          <a:xfrm>
-            <a:off x="-381804" y="13016"/>
-            <a:ext cx="9913822" cy="7173416"/>
-          </a:xfrm>
-          <a:prstGeom prst="rect">
-            <a:avLst/>
-          </a:prstGeom>
-        </p:spPr>
-      </p:pic>
-      <p:sp>
-        <p:nvSpPr>
-          <p:cNvPr id="2" name="1 Título"/>
-          <p:cNvSpPr>
-            <a:spLocks noGrp="1"/>
-          </p:cNvSpPr>
-          <p:nvPr>
-            <p:ph type="ctrTitle"/>
-            <p:custDataLst>
-              <p:tags r:id="rId3"/>
-            </p:custDataLst>
-          </p:nvPr>
-        </p:nvSpPr>
-        <p:spPr>
-          <a:xfrm>
-            <a:off x="-20748" y="87136"/>
-            <a:ext cx="9144000" cy="1093136"/>
-          </a:xfrm>
-        </p:spPr>
-        <p:txBody>
-          <a:bodyPr>
-            <a:normAutofit fontScale="90000"/>
-          </a:bodyPr>
-          <a:lstStyle/>
-          <a:p>
-            <a:r>
-              <a:rPr lang="es-PE" sz="11500" b="1" spc="300" dirty="0" smtClean="0">
-                <a:solidFill>
-                  <a:srgbClr val="FFFFFF"/>
-                </a:solidFill>
-              </a:rPr>
-              <a:t>DEMO</a:t>
-            </a:r>
-            <a:endParaRPr lang="es-ES" sz="9600" b="1" spc="300" dirty="0">
-              <a:solidFill>
-                <a:srgbClr val="FFFFFF"/>
-              </a:solidFill>
-            </a:endParaRPr>
-          </a:p>
-        </p:txBody>
-      </p:sp>
-    </p:spTree>
-    <p:custDataLst>
-      <p:tags r:id="rId1"/>
-    </p:custDataLst>
-    <p:extLst>
-      <p:ext uri="{BB962C8B-B14F-4D97-AF65-F5344CB8AC3E}">
-        <p14:creationId xmlns:p14="http://schemas.microsoft.com/office/powerpoint/2010/main" val="3149365002"/>
-      </p:ext>
-    </p:extLst>
-  </p:cSld>
-  <p:clrMapOvr>
-    <a:masterClrMapping/>
-  </p:clrMapOvr>
-  <p:timing>
-    <p:tnLst>
-      <p:par>
-        <p:cTn xmlns:p14="http://schemas.microsoft.com/office/powerpoint/2010/main" id="1" dur="indefinite" restart="never" nodeType="tmRoot"/>
-      </p:par>
-    </p:tnLst>
-  </p:timing>
-</p:sld>
-</file>
-
 <file path=ppt/slides/slide15.xml><?xml version="1.0" encoding="utf-8"?>
 <p:sld xmlns:a="http://schemas.openxmlformats.org/drawingml/2006/main" xmlns:r="http://schemas.openxmlformats.org/officeDocument/2006/relationships" xmlns:p="http://schemas.openxmlformats.org/presentationml/2006/main">
   <p:cSld>
@@ -9391,78 +9618,127 @@
           <a:chExt cx="0" cy="0"/>
         </a:xfrm>
       </p:grpSpPr>
-      <p:pic>
-        <p:nvPicPr>
-          <p:cNvPr id="3" name="2 Imagen"/>
-          <p:cNvPicPr>
-            <a:picLocks noChangeAspect="1"/>
-          </p:cNvPicPr>
-          <p:nvPr>
+      <p:sp>
+        <p:nvSpPr>
+          <p:cNvPr id="18" name="1 Título"/>
+          <p:cNvSpPr>
+            <a:spLocks noGrp="1"/>
+          </p:cNvSpPr>
+          <p:nvPr>
+            <p:ph type="title"/>
             <p:custDataLst>
               <p:tags r:id="rId2"/>
             </p:custDataLst>
           </p:nvPr>
-        </p:nvPicPr>
-        <p:blipFill>
-          <a:blip r:embed="rId6">
-            <a:extLst>
-              <a:ext uri="{28A0092B-C50C-407E-A947-70E740481C1C}">
-                <a14:useLocalDpi xmlns:a14="http://schemas.microsoft.com/office/drawing/2010/main"/>
-              </a:ext>
-            </a:extLst>
-          </a:blip>
-          <a:stretch>
-            <a:fillRect/>
-          </a:stretch>
-        </p:blipFill>
+        </p:nvSpPr>
         <p:spPr>
           <a:xfrm>
-            <a:off x="-249282" y="-2112"/>
-            <a:ext cx="9717826" cy="6858000"/>
+            <a:off x="457200" y="332656"/>
+            <a:ext cx="8229600" cy="1224136"/>
+          </a:xfrm>
+        </p:spPr>
+        <p:txBody>
+          <a:bodyPr>
+            <a:normAutofit fontScale="90000"/>
+          </a:bodyPr>
+          <a:lstStyle/>
+          <a:p>
+            <a:r>
+              <a:rPr lang="es-PE" dirty="0" smtClean="0">
+                <a:solidFill>
+                  <a:srgbClr val="FF0000"/>
+                </a:solidFill>
+              </a:rPr>
+              <a:t>Cómo triunfar en este desafío </a:t>
+            </a:r>
+            <a:br>
+              <a:rPr lang="es-PE" dirty="0" smtClean="0">
+                <a:solidFill>
+                  <a:srgbClr val="FF0000"/>
+                </a:solidFill>
+              </a:rPr>
+            </a:br>
+            <a:r>
+              <a:rPr lang="es-PE" dirty="0" smtClean="0">
+                <a:solidFill>
+                  <a:srgbClr val="FF0000"/>
+                </a:solidFill>
+              </a:rPr>
+              <a:t>(y en Refactoring)?</a:t>
+            </a:r>
+            <a:endParaRPr lang="es-PE" dirty="0">
+              <a:solidFill>
+                <a:srgbClr val="FF0000"/>
+              </a:solidFill>
+            </a:endParaRPr>
+          </a:p>
+        </p:txBody>
+      </p:sp>
+      <p:graphicFrame>
+        <p:nvGraphicFramePr>
+          <p:cNvPr id="4" name="12 Diagrama"/>
+          <p:cNvGraphicFramePr/>
+          <p:nvPr>
+            <p:extLst>
+              <p:ext uri="{D42A27DB-BD31-4B8C-83A1-F6EECF244321}">
+                <p14:modId xmlns:p14="http://schemas.microsoft.com/office/powerpoint/2010/main" val="469313183"/>
+              </p:ext>
+            </p:extLst>
+          </p:nvPr>
+        </p:nvGraphicFramePr>
+        <p:xfrm>
+          <a:off x="656531" y="3861048"/>
+          <a:ext cx="8163941" cy="1020680"/>
+        </p:xfrm>
+        <a:graphic>
+          <a:graphicData uri="http://schemas.openxmlformats.org/drawingml/2006/diagram">
+            <dgm:relIds xmlns:dgm="http://schemas.openxmlformats.org/drawingml/2006/diagram" xmlns:r="http://schemas.openxmlformats.org/officeDocument/2006/relationships" r:dm="rId6" r:lo="rId7" r:qs="rId8" r:cs="rId9"/>
+          </a:graphicData>
+        </a:graphic>
+      </p:graphicFrame>
+      <p:sp>
+        <p:nvSpPr>
+          <p:cNvPr id="5" name="2 Rectángulo"/>
+          <p:cNvSpPr/>
+          <p:nvPr>
+            <p:custDataLst>
+              <p:tags r:id="rId3"/>
+            </p:custDataLst>
+          </p:nvPr>
+        </p:nvSpPr>
+        <p:spPr>
+          <a:xfrm>
+            <a:off x="395536" y="2187441"/>
+            <a:ext cx="8280920" cy="1169551"/>
           </a:xfrm>
           <a:prstGeom prst="rect">
             <a:avLst/>
           </a:prstGeom>
         </p:spPr>
-      </p:pic>
-      <p:sp>
-        <p:nvSpPr>
-          <p:cNvPr id="2" name="1 Título"/>
-          <p:cNvSpPr>
-            <a:spLocks noGrp="1"/>
-          </p:cNvSpPr>
-          <p:nvPr>
-            <p:ph type="ctrTitle"/>
-            <p:custDataLst>
-              <p:tags r:id="rId3"/>
-            </p:custDataLst>
-          </p:nvPr>
-        </p:nvSpPr>
-        <p:spPr>
-          <a:xfrm>
-            <a:off x="704264" y="5517232"/>
-            <a:ext cx="7810734" cy="1093136"/>
-          </a:xfrm>
-        </p:spPr>
-        <p:txBody>
-          <a:bodyPr>
-            <a:normAutofit fontScale="90000"/>
+        <p:txBody>
+          <a:bodyPr wrap="square">
+            <a:spAutoFit/>
           </a:bodyPr>
           <a:lstStyle/>
           <a:p>
-            <a:r>
-              <a:rPr lang="es-PE" sz="11500" b="1" spc="300" dirty="0" smtClean="0">
-                <a:solidFill>
-                  <a:schemeClr val="bg1"/>
-                </a:solidFill>
-              </a:rPr>
-              <a:t>1st COURSE</a:t>
-            </a:r>
-            <a:endParaRPr lang="es-ES" sz="9600" b="1" spc="300" dirty="0">
-              <a:solidFill>
-                <a:schemeClr val="bg1"/>
-              </a:solidFill>
-            </a:endParaRPr>
+            <a:pPr marL="457200" indent="-457200">
+              <a:buFont typeface="Arial"/>
+              <a:buChar char="•"/>
+            </a:pPr>
+            <a:r>
+              <a:rPr lang="es-PE" sz="3500" dirty="0" smtClean="0"/>
+              <a:t>Baby Steps</a:t>
+            </a:r>
+          </a:p>
+          <a:p>
+            <a:pPr marL="457200" indent="-457200">
+              <a:buFont typeface="Arial"/>
+              <a:buChar char="•"/>
+            </a:pPr>
+            <a:r>
+              <a:rPr lang="es-PE" sz="3500" dirty="0" smtClean="0"/>
+              <a:t>Ejecutar las pruebas constantemente</a:t>
+            </a:r>
           </a:p>
         </p:txBody>
       </p:sp>
@@ -9472,7 +9748,7 @@
     </p:custDataLst>
     <p:extLst>
       <p:ext uri="{BB962C8B-B14F-4D97-AF65-F5344CB8AC3E}">
-        <p14:creationId xmlns:p14="http://schemas.microsoft.com/office/powerpoint/2010/main" val="2661519987"/>
+        <p14:creationId xmlns:p14="http://schemas.microsoft.com/office/powerpoint/2010/main" val="1682063905"/>
       </p:ext>
     </p:extLst>
   </p:cSld>
@@ -9506,23 +9782,57 @@
           <a:chExt cx="0" cy="0"/>
         </a:xfrm>
       </p:grpSpPr>
-      <p:sp>
-        <p:nvSpPr>
-          <p:cNvPr id="18" name="1 Título"/>
-          <p:cNvSpPr>
-            <a:spLocks noGrp="1"/>
-          </p:cNvSpPr>
-          <p:nvPr>
-            <p:ph type="title"/>
+      <p:pic>
+        <p:nvPicPr>
+          <p:cNvPr id="4" name="3 Imagen"/>
+          <p:cNvPicPr>
+            <a:picLocks noChangeAspect="1"/>
+          </p:cNvPicPr>
+          <p:nvPr>
             <p:custDataLst>
               <p:tags r:id="rId2"/>
             </p:custDataLst>
           </p:nvPr>
-        </p:nvSpPr>
+        </p:nvPicPr>
+        <p:blipFill>
+          <a:blip r:embed="rId6" cstate="print">
+            <a:extLst>
+              <a:ext uri="{28A0092B-C50C-407E-A947-70E740481C1C}">
+                <a14:useLocalDpi xmlns:a14="http://schemas.microsoft.com/office/drawing/2010/main"/>
+              </a:ext>
+            </a:extLst>
+          </a:blip>
+          <a:stretch>
+            <a:fillRect/>
+          </a:stretch>
+        </p:blipFill>
         <p:spPr>
           <a:xfrm>
-            <a:off x="457200" y="1589389"/>
-            <a:ext cx="8229600" cy="792088"/>
+            <a:off x="-381804" y="13016"/>
+            <a:ext cx="9913822" cy="7173416"/>
+          </a:xfrm>
+          <a:prstGeom prst="rect">
+            <a:avLst/>
+          </a:prstGeom>
+        </p:spPr>
+      </p:pic>
+      <p:sp>
+        <p:nvSpPr>
+          <p:cNvPr id="2" name="1 Título"/>
+          <p:cNvSpPr>
+            <a:spLocks noGrp="1"/>
+          </p:cNvSpPr>
+          <p:nvPr>
+            <p:ph type="ctrTitle"/>
+            <p:custDataLst>
+              <p:tags r:id="rId3"/>
+            </p:custDataLst>
+          </p:nvPr>
+        </p:nvSpPr>
+        <p:spPr>
+          <a:xfrm>
+            <a:off x="-20748" y="87136"/>
+            <a:ext cx="9144000" cy="1093136"/>
           </a:xfrm>
         </p:spPr>
         <p:txBody>
@@ -9532,53 +9842,18 @@
           <a:lstStyle/>
           <a:p>
             <a:r>
-              <a:rPr lang="es-PE" sz="4800" dirty="0" smtClean="0">
+              <a:rPr lang="es-PE" sz="11500" b="1" spc="300" dirty="0" smtClean="0">
                 <a:solidFill>
-                  <a:srgbClr val="FF0000"/>
+                  <a:srgbClr val="FFFFFF"/>
                 </a:solidFill>
               </a:rPr>
-              <a:t>Objetivo</a:t>
-            </a:r>
-            <a:endParaRPr lang="es-PE" sz="4800" dirty="0">
+              <a:t>DEMO</a:t>
+            </a:r>
+            <a:endParaRPr lang="es-ES" sz="9600" b="1" spc="300" dirty="0">
               <a:solidFill>
-                <a:srgbClr val="FF0000"/>
+                <a:srgbClr val="FFFFFF"/>
               </a:solidFill>
             </a:endParaRPr>
-          </a:p>
-        </p:txBody>
-      </p:sp>
-      <p:sp>
-        <p:nvSpPr>
-          <p:cNvPr id="2" name="1 CuadroTexto"/>
-          <p:cNvSpPr txBox="1"/>
-          <p:nvPr>
-            <p:custDataLst>
-              <p:tags r:id="rId3"/>
-            </p:custDataLst>
-          </p:nvPr>
-        </p:nvSpPr>
-        <p:spPr>
-          <a:xfrm>
-            <a:off x="611560" y="2507644"/>
-            <a:ext cx="8064896" cy="1323439"/>
-          </a:xfrm>
-          <a:prstGeom prst="rect">
-            <a:avLst/>
-          </a:prstGeom>
-          <a:noFill/>
-        </p:spPr>
-        <p:txBody>
-          <a:bodyPr wrap="square" rtlCol="0">
-            <a:spAutoFit/>
-          </a:bodyPr>
-          <a:lstStyle/>
-          <a:p>
-            <a:pPr algn="ctr"/>
-            <a:r>
-              <a:rPr lang="es-PE" sz="4000" dirty="0" smtClean="0"/>
-              <a:t>Aprender y practicar refactorizaciones atómicas y complejas.</a:t>
-            </a:r>
-            <a:endParaRPr lang="es-PE" sz="4000" dirty="0"/>
           </a:p>
         </p:txBody>
       </p:sp>
@@ -9588,7 +9863,7 @@
     </p:custDataLst>
     <p:extLst>
       <p:ext uri="{BB962C8B-B14F-4D97-AF65-F5344CB8AC3E}">
-        <p14:creationId xmlns:p14="http://schemas.microsoft.com/office/powerpoint/2010/main" val="426973170"/>
+        <p14:creationId xmlns:p14="http://schemas.microsoft.com/office/powerpoint/2010/main" val="3149365002"/>
       </p:ext>
     </p:extLst>
   </p:cSld>
@@ -9622,23 +9897,57 @@
           <a:chExt cx="0" cy="0"/>
         </a:xfrm>
       </p:grpSpPr>
-      <p:sp>
-        <p:nvSpPr>
-          <p:cNvPr id="18" name="1 Título"/>
-          <p:cNvSpPr>
-            <a:spLocks noGrp="1"/>
-          </p:cNvSpPr>
-          <p:nvPr>
-            <p:ph type="title"/>
+      <p:pic>
+        <p:nvPicPr>
+          <p:cNvPr id="3" name="2 Imagen"/>
+          <p:cNvPicPr>
+            <a:picLocks noChangeAspect="1"/>
+          </p:cNvPicPr>
+          <p:nvPr>
             <p:custDataLst>
               <p:tags r:id="rId2"/>
             </p:custDataLst>
           </p:nvPr>
-        </p:nvSpPr>
+        </p:nvPicPr>
+        <p:blipFill>
+          <a:blip r:embed="rId6">
+            <a:extLst>
+              <a:ext uri="{28A0092B-C50C-407E-A947-70E740481C1C}">
+                <a14:useLocalDpi xmlns:a14="http://schemas.microsoft.com/office/drawing/2010/main"/>
+              </a:ext>
+            </a:extLst>
+          </a:blip>
+          <a:stretch>
+            <a:fillRect/>
+          </a:stretch>
+        </p:blipFill>
         <p:spPr>
           <a:xfrm>
-            <a:off x="457200" y="1589389"/>
-            <a:ext cx="8229600" cy="792088"/>
+            <a:off x="-249282" y="-2112"/>
+            <a:ext cx="9717826" cy="6858000"/>
+          </a:xfrm>
+          <a:prstGeom prst="rect">
+            <a:avLst/>
+          </a:prstGeom>
+        </p:spPr>
+      </p:pic>
+      <p:sp>
+        <p:nvSpPr>
+          <p:cNvPr id="2" name="1 Título"/>
+          <p:cNvSpPr>
+            <a:spLocks noGrp="1"/>
+          </p:cNvSpPr>
+          <p:nvPr>
+            <p:ph type="ctrTitle"/>
+            <p:custDataLst>
+              <p:tags r:id="rId3"/>
+            </p:custDataLst>
+          </p:nvPr>
+        </p:nvSpPr>
+        <p:spPr>
+          <a:xfrm>
+            <a:off x="704264" y="5517232"/>
+            <a:ext cx="7810734" cy="1093136"/>
           </a:xfrm>
         </p:spPr>
         <p:txBody>
@@ -9648,60 +9957,18 @@
           <a:lstStyle/>
           <a:p>
             <a:r>
-              <a:rPr lang="es-PE" sz="4800" dirty="0" smtClean="0">
+              <a:rPr lang="es-PE" sz="11500" b="1" spc="300" dirty="0" smtClean="0">
                 <a:solidFill>
-                  <a:srgbClr val="FF0000"/>
+                  <a:schemeClr val="bg1"/>
                 </a:solidFill>
               </a:rPr>
-              <a:t>Descripción</a:t>
-            </a:r>
-            <a:endParaRPr lang="es-PE" sz="4800" dirty="0">
+              <a:t>1st COURSE</a:t>
+            </a:r>
+            <a:endParaRPr lang="es-ES" sz="9600" b="1" spc="300" dirty="0">
               <a:solidFill>
-                <a:srgbClr val="FF0000"/>
+                <a:schemeClr val="bg1"/>
               </a:solidFill>
             </a:endParaRPr>
-          </a:p>
-        </p:txBody>
-      </p:sp>
-      <p:sp>
-        <p:nvSpPr>
-          <p:cNvPr id="2" name="1 CuadroTexto"/>
-          <p:cNvSpPr txBox="1"/>
-          <p:nvPr>
-            <p:custDataLst>
-              <p:tags r:id="rId3"/>
-            </p:custDataLst>
-          </p:nvPr>
-        </p:nvSpPr>
-        <p:spPr>
-          <a:xfrm>
-            <a:off x="611560" y="2507644"/>
-            <a:ext cx="8064896" cy="1323439"/>
-          </a:xfrm>
-          <a:prstGeom prst="rect">
-            <a:avLst/>
-          </a:prstGeom>
-          <a:noFill/>
-        </p:spPr>
-        <p:txBody>
-          <a:bodyPr wrap="square" rtlCol="0">
-            <a:spAutoFit/>
-          </a:bodyPr>
-          <a:lstStyle/>
-          <a:p>
-            <a:pPr algn="ctr"/>
-            <a:r>
-              <a:rPr lang="es-PE" sz="4000" dirty="0"/>
-              <a:t>El código </a:t>
-            </a:r>
-            <a:r>
-              <a:rPr lang="es-PE" sz="4000" dirty="0" smtClean="0"/>
-              <a:t>representa el dominio de </a:t>
-            </a:r>
-            <a:r>
-              <a:rPr lang="es-PE" sz="4000" dirty="0"/>
-              <a:t>una tienda online de bicicletas.</a:t>
-            </a:r>
           </a:p>
         </p:txBody>
       </p:sp>
@@ -9711,7 +9978,7 @@
     </p:custDataLst>
     <p:extLst>
       <p:ext uri="{BB962C8B-B14F-4D97-AF65-F5344CB8AC3E}">
-        <p14:creationId xmlns:p14="http://schemas.microsoft.com/office/powerpoint/2010/main" val="2864752739"/>
+        <p14:creationId xmlns:p14="http://schemas.microsoft.com/office/powerpoint/2010/main" val="2661519987"/>
       </p:ext>
     </p:extLst>
   </p:cSld>
@@ -9760,7 +10027,7 @@
         </p:nvSpPr>
         <p:spPr>
           <a:xfrm>
-            <a:off x="457200" y="162000"/>
+            <a:off x="457200" y="1589389"/>
             <a:ext cx="8229600" cy="792088"/>
           </a:xfrm>
         </p:spPr>
@@ -9776,7 +10043,7 @@
                   <a:srgbClr val="FF0000"/>
                 </a:solidFill>
               </a:rPr>
-              <a:t>Reglas</a:t>
+              <a:t>Objetivo</a:t>
             </a:r>
             <a:endParaRPr lang="es-PE" sz="4800" dirty="0">
               <a:solidFill>
@@ -9798,8 +10065,8 @@
         </p:nvSpPr>
         <p:spPr>
           <a:xfrm>
-            <a:off x="251520" y="908720"/>
-            <a:ext cx="8640960" cy="1569660"/>
+            <a:off x="611560" y="2507644"/>
+            <a:ext cx="8064896" cy="1323439"/>
           </a:xfrm>
           <a:prstGeom prst="rect">
             <a:avLst/>
@@ -9814,130 +10081,20 @@
           <a:p>
             <a:pPr algn="ctr"/>
             <a:r>
-              <a:rPr lang="es-PE" sz="3200" dirty="0" smtClean="0"/>
-              <a:t>Es un juego de 3 hoyos, todos los equipos comenzarán en el </a:t>
-            </a:r>
-            <a:r>
-              <a:rPr lang="es-PE" sz="3200" dirty="0" err="1" smtClean="0"/>
-              <a:t>tee</a:t>
-            </a:r>
-            <a:r>
-              <a:rPr lang="es-PE" sz="3200" dirty="0" smtClean="0"/>
-              <a:t> y en los siguientes hoyos de manera simultanea.</a:t>
-            </a:r>
-          </a:p>
-        </p:txBody>
-      </p:sp>
-      <p:sp>
-        <p:nvSpPr>
-          <p:cNvPr id="3" name="2 Rectángulo"/>
-          <p:cNvSpPr/>
-          <p:nvPr>
-            <p:custDataLst>
-              <p:tags r:id="rId4"/>
-            </p:custDataLst>
-          </p:nvPr>
-        </p:nvSpPr>
-        <p:spPr>
-          <a:xfrm>
-            <a:off x="251520" y="5229200"/>
-            <a:ext cx="8640960" cy="1077218"/>
-          </a:xfrm>
-          <a:prstGeom prst="rect">
-            <a:avLst/>
-          </a:prstGeom>
-        </p:spPr>
-        <p:txBody>
-          <a:bodyPr wrap="square">
-            <a:spAutoFit/>
-          </a:bodyPr>
-          <a:lstStyle/>
-          <a:p>
-            <a:pPr algn="ctr"/>
-            <a:r>
-              <a:rPr lang="es-PE" sz="3200" dirty="0" smtClean="0"/>
-              <a:t>El tiempo por hoyo es 12 minutos, al finalizar cada hoyo el mejor equipo mostrará sus resultados.</a:t>
-            </a:r>
-            <a:endParaRPr lang="es-PE" sz="3200" dirty="0"/>
-          </a:p>
-        </p:txBody>
-      </p:sp>
-      <p:pic>
-        <p:nvPicPr>
-          <p:cNvPr id="1027" name="Picture 3"/>
-          <p:cNvPicPr>
-            <a:picLocks noChangeAspect="1" noChangeArrowheads="1"/>
-          </p:cNvPicPr>
-          <p:nvPr>
-            <p:custDataLst>
-              <p:tags r:id="rId5"/>
-            </p:custDataLst>
-          </p:nvPr>
-        </p:nvPicPr>
-        <p:blipFill>
-          <a:blip r:embed="rId8">
-            <a:extLst>
-              <a:ext uri="{28A0092B-C50C-407E-A947-70E740481C1C}">
-                <a14:useLocalDpi xmlns:a14="http://schemas.microsoft.com/office/drawing/2010/main"/>
-              </a:ext>
-            </a:extLst>
-          </a:blip>
-          <a:srcRect/>
-          <a:stretch>
-            <a:fillRect/>
-          </a:stretch>
-        </p:blipFill>
-        <p:spPr bwMode="auto">
-          <a:xfrm>
-            <a:off x="3137609" y="2564904"/>
-            <a:ext cx="3306599" cy="2576714"/>
-          </a:xfrm>
-          <a:prstGeom prst="rect">
-            <a:avLst/>
-          </a:prstGeom>
-          <a:ln>
-            <a:noFill/>
-          </a:ln>
-          <a:effectLst>
-            <a:softEdge rad="112500"/>
-          </a:effectLst>
-          <a:extLst>
-            <a:ext uri="{909E8E84-426E-40dd-AFC4-6F175D3DCCD1}">
-              <a14:hiddenFill xmlns:a14="http://schemas.microsoft.com/office/drawing/2010/main">
-                <a:solidFill>
-                  <a:schemeClr val="accent1"/>
-                </a:solidFill>
-              </a14:hiddenFill>
-            </a:ext>
-            <a:ext uri="{91240B29-F687-4f45-9708-019B960494DF}">
-              <a14:hiddenLine xmlns:a14="http://schemas.microsoft.com/office/drawing/2010/main" w="9525">
-                <a:solidFill>
-                  <a:schemeClr val="tx1"/>
-                </a:solidFill>
-                <a:miter lim="800000"/>
-                <a:headEnd/>
-                <a:tailEnd/>
-              </a14:hiddenLine>
-            </a:ext>
-            <a:ext uri="{AF507438-7753-43e0-B8FC-AC1667EBCBE1}">
-              <a14:hiddenEffects xmlns:a14="http://schemas.microsoft.com/office/drawing/2010/main">
-                <a:effectLst>
-                  <a:outerShdw dist="35921" dir="2700000" algn="ctr" rotWithShape="0">
-                    <a:schemeClr val="bg2"/>
-                  </a:outerShdw>
-                </a:effectLst>
-              </a14:hiddenEffects>
-            </a:ext>
-          </a:extLst>
-        </p:spPr>
-      </p:pic>
+              <a:rPr lang="es-PE" sz="4000" dirty="0" smtClean="0"/>
+              <a:t>Aprender y practicar refactorizaciones atómicas y complejas.</a:t>
+            </a:r>
+            <a:endParaRPr lang="es-PE" sz="4000" dirty="0"/>
+          </a:p>
+        </p:txBody>
+      </p:sp>
     </p:spTree>
     <p:custDataLst>
       <p:tags r:id="rId1"/>
     </p:custDataLst>
     <p:extLst>
       <p:ext uri="{BB962C8B-B14F-4D97-AF65-F5344CB8AC3E}">
-        <p14:creationId xmlns:p14="http://schemas.microsoft.com/office/powerpoint/2010/main" val="3539184923"/>
+        <p14:creationId xmlns:p14="http://schemas.microsoft.com/office/powerpoint/2010/main" val="426973170"/>
       </p:ext>
     </p:extLst>
   </p:cSld>
@@ -9973,52 +10130,63 @@
       </p:grpSpPr>
       <p:sp>
         <p:nvSpPr>
-          <p:cNvPr id="5" name="1 Título"/>
+          <p:cNvPr id="18" name="1 Título"/>
           <p:cNvSpPr>
             <a:spLocks noGrp="1"/>
           </p:cNvSpPr>
           <p:nvPr>
             <p:ph type="title"/>
+            <p:custDataLst>
+              <p:tags r:id="rId2"/>
+            </p:custDataLst>
           </p:nvPr>
         </p:nvSpPr>
         <p:spPr>
           <a:xfrm>
-            <a:off x="503220" y="332656"/>
-            <a:ext cx="8229600" cy="720080"/>
+            <a:off x="457200" y="1589389"/>
+            <a:ext cx="8229600" cy="792088"/>
           </a:xfrm>
         </p:spPr>
         <p:txBody>
-          <a:bodyPr vert="horz" lIns="91440" tIns="45720" rIns="91440" bIns="45720" rtlCol="0" anchor="ctr">
+          <a:bodyPr>
             <a:normAutofit fontScale="90000"/>
           </a:bodyPr>
           <a:lstStyle/>
           <a:p>
             <a:r>
-              <a:rPr lang="es-PE" sz="4800" dirty="0">
+              <a:rPr lang="es-PE" sz="4800" dirty="0" smtClean="0">
                 <a:solidFill>
                   <a:srgbClr val="FF0000"/>
                 </a:solidFill>
               </a:rPr>
-              <a:t>Próximos Pasos</a:t>
-            </a:r>
-          </a:p>
-        </p:txBody>
-      </p:sp>
-      <p:sp>
-        <p:nvSpPr>
-          <p:cNvPr id="6" name="2 Marcador de contenido"/>
-          <p:cNvSpPr>
-            <a:spLocks noGrp="1"/>
-          </p:cNvSpPr>
-          <p:nvPr>
-            <p:ph idx="1"/>
+              <a:t>Descripción</a:t>
+            </a:r>
+            <a:endParaRPr lang="es-PE" sz="4800" dirty="0">
+              <a:solidFill>
+                <a:srgbClr val="FF0000"/>
+              </a:solidFill>
+            </a:endParaRPr>
+          </a:p>
+        </p:txBody>
+      </p:sp>
+      <p:sp>
+        <p:nvSpPr>
+          <p:cNvPr id="2" name="1 CuadroTexto"/>
+          <p:cNvSpPr txBox="1"/>
+          <p:nvPr>
+            <p:custDataLst>
+              <p:tags r:id="rId3"/>
+            </p:custDataLst>
           </p:nvPr>
         </p:nvSpPr>
         <p:spPr>
           <a:xfrm>
-            <a:off x="627641" y="1556792"/>
-            <a:ext cx="7980759" cy="4154984"/>
+            <a:off x="611560" y="2507644"/>
+            <a:ext cx="8064896" cy="1323439"/>
           </a:xfrm>
+          <a:prstGeom prst="rect">
+            <a:avLst/>
+          </a:prstGeom>
           <a:noFill/>
         </p:spPr>
         <p:txBody>
@@ -10027,40 +10195,18 @@
           </a:bodyPr>
           <a:lstStyle/>
           <a:p>
-            <a:pPr marL="0" algn="ctr" defTabSz="914400"/>
+            <a:pPr algn="ctr"/>
             <a:r>
               <a:rPr lang="es-PE" sz="4000" dirty="0"/>
-              <a:t>Practiquen este u otro Kata en su casa.</a:t>
-            </a:r>
-          </a:p>
-          <a:p>
-            <a:pPr marL="0" indent="0" algn="ctr" defTabSz="914400">
-              <a:buNone/>
-            </a:pPr>
-            <a:endParaRPr lang="es-PE" sz="4000" dirty="0"/>
-          </a:p>
-          <a:p>
-            <a:pPr marL="0" algn="ctr" defTabSz="914400"/>
+              <a:t>El código </a:t>
+            </a:r>
+            <a:r>
+              <a:rPr lang="es-PE" sz="4000" dirty="0" smtClean="0"/>
+              <a:t>representa el dominio de </a:t>
+            </a:r>
             <a:r>
               <a:rPr lang="es-PE" sz="4000" dirty="0"/>
-              <a:t>Organicen sus propios </a:t>
-            </a:r>
-            <a:r>
-              <a:rPr lang="es-PE" sz="4000" dirty="0" smtClean="0"/>
-              <a:t>Dojos en </a:t>
-            </a:r>
-            <a:r>
-              <a:rPr lang="es-PE" sz="4000" dirty="0"/>
-              <a:t>su trabajo o comunidad. </a:t>
-            </a:r>
-          </a:p>
-          <a:p>
-            <a:pPr marL="0" indent="0" algn="ctr" defTabSz="914400">
-              <a:buNone/>
-            </a:pPr>
-            <a:r>
-              <a:rPr lang="es-PE" sz="4000" dirty="0"/>
-              <a:t>(pueden utilizar esta presentación)</a:t>
+              <a:t>una tienda online de bicicletas.</a:t>
             </a:r>
           </a:p>
         </p:txBody>
@@ -10071,7 +10217,7 @@
     </p:custDataLst>
     <p:extLst>
       <p:ext uri="{BB962C8B-B14F-4D97-AF65-F5344CB8AC3E}">
-        <p14:creationId xmlns:p14="http://schemas.microsoft.com/office/powerpoint/2010/main" val="2616784292"/>
+        <p14:creationId xmlns:p14="http://schemas.microsoft.com/office/powerpoint/2010/main" val="2864752739"/>
       </p:ext>
     </p:extLst>
   </p:cSld>
@@ -10107,6 +10253,526 @@
       </p:grpSpPr>
       <p:sp>
         <p:nvSpPr>
+          <p:cNvPr id="4" name="Text Box 2"/>
+          <p:cNvSpPr txBox="1">
+            <a:spLocks noChangeArrowheads="1"/>
+          </p:cNvSpPr>
+          <p:nvPr/>
+        </p:nvSpPr>
+        <p:spPr bwMode="auto">
+          <a:xfrm>
+            <a:off x="3668803" y="1031136"/>
+            <a:ext cx="4800600" cy="3429000"/>
+          </a:xfrm>
+          <a:prstGeom prst="rect">
+            <a:avLst/>
+          </a:prstGeom>
+          <a:noFill/>
+          <a:ln w="9525">
+            <a:noFill/>
+            <a:round/>
+            <a:headEnd/>
+            <a:tailEnd/>
+          </a:ln>
+        </p:spPr>
+        <p:txBody>
+          <a:bodyPr lIns="90000" tIns="46800" rIns="90000" bIns="46800"/>
+          <a:lstStyle/>
+          <a:p>
+            <a:pPr marL="319088" indent="-315913" algn="r">
+              <a:spcBef>
+                <a:spcPts val="700"/>
+              </a:spcBef>
+              <a:buClrTx/>
+              <a:buSzPct val="60000"/>
+              <a:buFontTx/>
+              <a:buNone/>
+              <a:tabLst>
+                <a:tab pos="319088" algn="l"/>
+                <a:tab pos="776288" algn="l"/>
+                <a:tab pos="1233488" algn="l"/>
+                <a:tab pos="1690688" algn="l"/>
+                <a:tab pos="2147888" algn="l"/>
+                <a:tab pos="2605088" algn="l"/>
+                <a:tab pos="3062288" algn="l"/>
+                <a:tab pos="3519488" algn="l"/>
+                <a:tab pos="3976688" algn="l"/>
+                <a:tab pos="4433888" algn="l"/>
+                <a:tab pos="4891088" algn="l"/>
+                <a:tab pos="5348288" algn="l"/>
+                <a:tab pos="5805488" algn="l"/>
+                <a:tab pos="6262688" algn="l"/>
+                <a:tab pos="6719888" algn="l"/>
+                <a:tab pos="7177088" algn="l"/>
+                <a:tab pos="7634288" algn="l"/>
+                <a:tab pos="8091488" algn="l"/>
+                <a:tab pos="8548688" algn="l"/>
+                <a:tab pos="9005888" algn="l"/>
+                <a:tab pos="9463088" algn="l"/>
+              </a:tabLst>
+            </a:pPr>
+            <a:r>
+              <a:rPr lang="es-PE" sz="4000" b="1" dirty="0" smtClean="0">
+                <a:solidFill>
+                  <a:srgbClr val="000000"/>
+                </a:solidFill>
+              </a:rPr>
+              <a:t>Angel Núñez</a:t>
+            </a:r>
+            <a:endParaRPr lang="es-PE" sz="4000" b="1" dirty="0">
+              <a:solidFill>
+                <a:srgbClr val="000000"/>
+              </a:solidFill>
+            </a:endParaRPr>
+          </a:p>
+          <a:p>
+            <a:pPr marL="319088" indent="-315913" algn="r">
+              <a:spcBef>
+                <a:spcPts val="700"/>
+              </a:spcBef>
+              <a:buSzPct val="60000"/>
+              <a:tabLst>
+                <a:tab pos="319088" algn="l"/>
+                <a:tab pos="776288" algn="l"/>
+                <a:tab pos="1233488" algn="l"/>
+                <a:tab pos="1690688" algn="l"/>
+                <a:tab pos="2147888" algn="l"/>
+                <a:tab pos="2605088" algn="l"/>
+                <a:tab pos="3062288" algn="l"/>
+                <a:tab pos="3519488" algn="l"/>
+                <a:tab pos="3976688" algn="l"/>
+                <a:tab pos="4433888" algn="l"/>
+                <a:tab pos="4891088" algn="l"/>
+                <a:tab pos="5348288" algn="l"/>
+                <a:tab pos="5805488" algn="l"/>
+                <a:tab pos="6262688" algn="l"/>
+                <a:tab pos="6719888" algn="l"/>
+                <a:tab pos="7177088" algn="l"/>
+                <a:tab pos="7634288" algn="l"/>
+                <a:tab pos="8091488" algn="l"/>
+                <a:tab pos="8548688" algn="l"/>
+                <a:tab pos="9005888" algn="l"/>
+                <a:tab pos="9463088" algn="l"/>
+              </a:tabLst>
+            </a:pPr>
+            <a:r>
+              <a:rPr lang="es-PE" sz="2000" b="1" dirty="0" smtClean="0">
+                <a:solidFill>
+                  <a:schemeClr val="tx1">
+                    <a:lumMod val="65000"/>
+                    <a:lumOff val="35000"/>
+                  </a:schemeClr>
+                </a:solidFill>
+              </a:rPr>
+              <a:t>Agile Coach &amp; Trainer</a:t>
+            </a:r>
+            <a:endParaRPr lang="es-PE" sz="2000" b="1" dirty="0">
+              <a:solidFill>
+                <a:schemeClr val="tx1">
+                  <a:lumMod val="65000"/>
+                  <a:lumOff val="35000"/>
+                </a:schemeClr>
+              </a:solidFill>
+            </a:endParaRPr>
+          </a:p>
+          <a:p>
+            <a:pPr marL="319088" indent="-315913" algn="r">
+              <a:spcBef>
+                <a:spcPts val="700"/>
+              </a:spcBef>
+              <a:buClrTx/>
+              <a:buSzPct val="60000"/>
+              <a:buFontTx/>
+              <a:buNone/>
+              <a:tabLst>
+                <a:tab pos="319088" algn="l"/>
+                <a:tab pos="776288" algn="l"/>
+                <a:tab pos="1233488" algn="l"/>
+                <a:tab pos="1690688" algn="l"/>
+                <a:tab pos="2147888" algn="l"/>
+                <a:tab pos="2605088" algn="l"/>
+                <a:tab pos="3062288" algn="l"/>
+                <a:tab pos="3519488" algn="l"/>
+                <a:tab pos="3976688" algn="l"/>
+                <a:tab pos="4433888" algn="l"/>
+                <a:tab pos="4891088" algn="l"/>
+                <a:tab pos="5348288" algn="l"/>
+                <a:tab pos="5805488" algn="l"/>
+                <a:tab pos="6262688" algn="l"/>
+                <a:tab pos="6719888" algn="l"/>
+                <a:tab pos="7177088" algn="l"/>
+                <a:tab pos="7634288" algn="l"/>
+                <a:tab pos="8091488" algn="l"/>
+                <a:tab pos="8548688" algn="l"/>
+                <a:tab pos="9005888" algn="l"/>
+                <a:tab pos="9463088" algn="l"/>
+              </a:tabLst>
+            </a:pPr>
+            <a:r>
+              <a:rPr lang="es-PE" sz="2000" b="1" dirty="0">
+                <a:solidFill>
+                  <a:schemeClr val="tx1">
+                    <a:lumMod val="65000"/>
+                    <a:lumOff val="35000"/>
+                  </a:schemeClr>
+                </a:solidFill>
+              </a:rPr>
+              <a:t>CSP | CSM | PMI-ACP | CSPO | CSD</a:t>
+            </a:r>
+            <a:endParaRPr lang="es-PE" sz="2000" b="1" i="1" dirty="0">
+              <a:solidFill>
+                <a:srgbClr val="F6640A"/>
+              </a:solidFill>
+            </a:endParaRPr>
+          </a:p>
+          <a:p>
+            <a:pPr marL="319088" indent="-315913" algn="r">
+              <a:spcBef>
+                <a:spcPts val="700"/>
+              </a:spcBef>
+              <a:buClrTx/>
+              <a:buSzPct val="60000"/>
+              <a:buFontTx/>
+              <a:buNone/>
+              <a:tabLst>
+                <a:tab pos="319088" algn="l"/>
+                <a:tab pos="776288" algn="l"/>
+                <a:tab pos="1233488" algn="l"/>
+                <a:tab pos="1690688" algn="l"/>
+                <a:tab pos="2147888" algn="l"/>
+                <a:tab pos="2605088" algn="l"/>
+                <a:tab pos="3062288" algn="l"/>
+                <a:tab pos="3519488" algn="l"/>
+                <a:tab pos="3976688" algn="l"/>
+                <a:tab pos="4433888" algn="l"/>
+                <a:tab pos="4891088" algn="l"/>
+                <a:tab pos="5348288" algn="l"/>
+                <a:tab pos="5805488" algn="l"/>
+                <a:tab pos="6262688" algn="l"/>
+                <a:tab pos="6719888" algn="l"/>
+                <a:tab pos="7177088" algn="l"/>
+                <a:tab pos="7634288" algn="l"/>
+                <a:tab pos="8091488" algn="l"/>
+                <a:tab pos="8548688" algn="l"/>
+                <a:tab pos="9005888" algn="l"/>
+                <a:tab pos="9463088" algn="l"/>
+              </a:tabLst>
+            </a:pPr>
+            <a:r>
+              <a:rPr lang="es-PE" sz="2800" dirty="0" smtClean="0">
+                <a:solidFill>
+                  <a:schemeClr val="tx2">
+                    <a:lumMod val="85000"/>
+                    <a:lumOff val="15000"/>
+                  </a:schemeClr>
+                </a:solidFill>
+                <a:hlinkClick r:id="rId2"/>
+              </a:rPr>
+              <a:t>angel.nunez@kleer.la</a:t>
+            </a:r>
+            <a:endParaRPr lang="es-PE" sz="2800" dirty="0" smtClean="0">
+              <a:solidFill>
+                <a:schemeClr val="tx2">
+                  <a:lumMod val="85000"/>
+                  <a:lumOff val="15000"/>
+                </a:schemeClr>
+              </a:solidFill>
+            </a:endParaRPr>
+          </a:p>
+          <a:p>
+            <a:pPr marL="319088" indent="-315913" algn="r">
+              <a:spcBef>
+                <a:spcPts val="700"/>
+              </a:spcBef>
+              <a:buClrTx/>
+              <a:buSzPct val="60000"/>
+              <a:buFontTx/>
+              <a:buNone/>
+              <a:tabLst>
+                <a:tab pos="319088" algn="l"/>
+                <a:tab pos="776288" algn="l"/>
+                <a:tab pos="1233488" algn="l"/>
+                <a:tab pos="1690688" algn="l"/>
+                <a:tab pos="2147888" algn="l"/>
+                <a:tab pos="2605088" algn="l"/>
+                <a:tab pos="3062288" algn="l"/>
+                <a:tab pos="3519488" algn="l"/>
+                <a:tab pos="3976688" algn="l"/>
+                <a:tab pos="4433888" algn="l"/>
+                <a:tab pos="4891088" algn="l"/>
+                <a:tab pos="5348288" algn="l"/>
+                <a:tab pos="5805488" algn="l"/>
+                <a:tab pos="6262688" algn="l"/>
+                <a:tab pos="6719888" algn="l"/>
+                <a:tab pos="7177088" algn="l"/>
+                <a:tab pos="7634288" algn="l"/>
+                <a:tab pos="8091488" algn="l"/>
+                <a:tab pos="8548688" algn="l"/>
+                <a:tab pos="9005888" algn="l"/>
+                <a:tab pos="9463088" algn="l"/>
+              </a:tabLst>
+            </a:pPr>
+            <a:r>
+              <a:rPr lang="es-PE" sz="2800" b="1" dirty="0" smtClean="0">
+                <a:solidFill>
+                  <a:schemeClr val="tx2">
+                    <a:lumMod val="85000"/>
+                    <a:lumOff val="15000"/>
+                  </a:schemeClr>
+                </a:solidFill>
+              </a:rPr>
+              <a:t>@snahider</a:t>
+            </a:r>
+            <a:endParaRPr lang="es-PE" sz="2800" b="1" dirty="0">
+              <a:solidFill>
+                <a:schemeClr val="tx2">
+                  <a:lumMod val="85000"/>
+                  <a:lumOff val="15000"/>
+                </a:schemeClr>
+              </a:solidFill>
+            </a:endParaRPr>
+          </a:p>
+          <a:p>
+            <a:pPr marL="319088" indent="-315913" algn="r">
+              <a:spcBef>
+                <a:spcPts val="700"/>
+              </a:spcBef>
+              <a:buClrTx/>
+              <a:buSzPct val="60000"/>
+              <a:buFontTx/>
+              <a:buNone/>
+              <a:tabLst>
+                <a:tab pos="319088" algn="l"/>
+                <a:tab pos="776288" algn="l"/>
+                <a:tab pos="1233488" algn="l"/>
+                <a:tab pos="1690688" algn="l"/>
+                <a:tab pos="2147888" algn="l"/>
+                <a:tab pos="2605088" algn="l"/>
+                <a:tab pos="3062288" algn="l"/>
+                <a:tab pos="3519488" algn="l"/>
+                <a:tab pos="3976688" algn="l"/>
+                <a:tab pos="4433888" algn="l"/>
+                <a:tab pos="4891088" algn="l"/>
+                <a:tab pos="5348288" algn="l"/>
+                <a:tab pos="5805488" algn="l"/>
+                <a:tab pos="6262688" algn="l"/>
+                <a:tab pos="6719888" algn="l"/>
+                <a:tab pos="7177088" algn="l"/>
+                <a:tab pos="7634288" algn="l"/>
+                <a:tab pos="8091488" algn="l"/>
+                <a:tab pos="8548688" algn="l"/>
+                <a:tab pos="9005888" algn="l"/>
+                <a:tab pos="9463088" algn="l"/>
+              </a:tabLst>
+            </a:pPr>
+            <a:endParaRPr lang="es-PE" sz="2000" i="1" dirty="0">
+              <a:solidFill>
+                <a:srgbClr val="F6640A"/>
+              </a:solidFill>
+            </a:endParaRPr>
+          </a:p>
+          <a:p>
+            <a:pPr marL="319088" indent="-315913" algn="r">
+              <a:spcBef>
+                <a:spcPts val="700"/>
+              </a:spcBef>
+              <a:buClrTx/>
+              <a:buSzPct val="60000"/>
+              <a:buFontTx/>
+              <a:buNone/>
+              <a:tabLst>
+                <a:tab pos="319088" algn="l"/>
+                <a:tab pos="776288" algn="l"/>
+                <a:tab pos="1233488" algn="l"/>
+                <a:tab pos="1690688" algn="l"/>
+                <a:tab pos="2147888" algn="l"/>
+                <a:tab pos="2605088" algn="l"/>
+                <a:tab pos="3062288" algn="l"/>
+                <a:tab pos="3519488" algn="l"/>
+                <a:tab pos="3976688" algn="l"/>
+                <a:tab pos="4433888" algn="l"/>
+                <a:tab pos="4891088" algn="l"/>
+                <a:tab pos="5348288" algn="l"/>
+                <a:tab pos="5805488" algn="l"/>
+                <a:tab pos="6262688" algn="l"/>
+                <a:tab pos="6719888" algn="l"/>
+                <a:tab pos="7177088" algn="l"/>
+                <a:tab pos="7634288" algn="l"/>
+                <a:tab pos="8091488" algn="l"/>
+                <a:tab pos="8548688" algn="l"/>
+                <a:tab pos="9005888" algn="l"/>
+                <a:tab pos="9463088" algn="l"/>
+              </a:tabLst>
+            </a:pPr>
+            <a:endParaRPr lang="es-PE" sz="2000" i="1" dirty="0">
+              <a:solidFill>
+                <a:schemeClr val="tx1"/>
+              </a:solidFill>
+            </a:endParaRPr>
+          </a:p>
+        </p:txBody>
+      </p:sp>
+      <p:pic>
+        <p:nvPicPr>
+          <p:cNvPr id="5" name="Picture 4"/>
+          <p:cNvPicPr>
+            <a:picLocks noChangeAspect="1"/>
+          </p:cNvPicPr>
+          <p:nvPr/>
+        </p:nvPicPr>
+        <p:blipFill>
+          <a:blip r:embed="rId3" cstate="email">
+            <a:clrChange>
+              <a:clrFrom>
+                <a:srgbClr val="FFFFFF"/>
+              </a:clrFrom>
+              <a:clrTo>
+                <a:srgbClr val="FFFFFF">
+                  <a:alpha val="0"/>
+                </a:srgbClr>
+              </a:clrTo>
+            </a:clrChange>
+            <a:extLst>
+              <a:ext uri="{28A0092B-C50C-407E-A947-70E740481C1C}">
+                <a14:useLocalDpi xmlns:a14="http://schemas.microsoft.com/office/drawing/2010/main"/>
+              </a:ext>
+            </a:extLst>
+          </a:blip>
+          <a:stretch>
+            <a:fillRect/>
+          </a:stretch>
+        </p:blipFill>
+        <p:spPr>
+          <a:xfrm>
+            <a:off x="4357489" y="3064062"/>
+            <a:ext cx="724978" cy="724978"/>
+          </a:xfrm>
+          <a:prstGeom prst="rect">
+            <a:avLst/>
+          </a:prstGeom>
+        </p:spPr>
+      </p:pic>
+      <p:pic>
+        <p:nvPicPr>
+          <p:cNvPr id="6" name="Picture 5"/>
+          <p:cNvPicPr>
+            <a:picLocks noChangeAspect="1"/>
+          </p:cNvPicPr>
+          <p:nvPr/>
+        </p:nvPicPr>
+        <p:blipFill>
+          <a:blip r:embed="rId4" cstate="email">
+            <a:extLst>
+              <a:ext uri="{28A0092B-C50C-407E-A947-70E740481C1C}">
+                <a14:useLocalDpi xmlns:a14="http://schemas.microsoft.com/office/drawing/2010/main"/>
+              </a:ext>
+            </a:extLst>
+          </a:blip>
+          <a:stretch>
+            <a:fillRect/>
+          </a:stretch>
+        </p:blipFill>
+        <p:spPr>
+          <a:xfrm>
+            <a:off x="4504639" y="2631273"/>
+            <a:ext cx="381000" cy="381000"/>
+          </a:xfrm>
+          <a:prstGeom prst="rect">
+            <a:avLst/>
+          </a:prstGeom>
+        </p:spPr>
+      </p:pic>
+      <p:pic>
+        <p:nvPicPr>
+          <p:cNvPr id="8" name="Picture 7"/>
+          <p:cNvPicPr>
+            <a:picLocks noChangeAspect="1"/>
+          </p:cNvPicPr>
+          <p:nvPr/>
+        </p:nvPicPr>
+        <p:blipFill>
+          <a:blip r:embed="rId5" cstate="email">
+            <a:extLst>
+              <a:ext uri="{28A0092B-C50C-407E-A947-70E740481C1C}">
+                <a14:useLocalDpi xmlns:a14="http://schemas.microsoft.com/office/drawing/2010/main"/>
+              </a:ext>
+            </a:extLst>
+          </a:blip>
+          <a:stretch>
+            <a:fillRect/>
+          </a:stretch>
+        </p:blipFill>
+        <p:spPr>
+          <a:xfrm>
+            <a:off x="766814" y="1182614"/>
+            <a:ext cx="3041386" cy="3041386"/>
+          </a:xfrm>
+          <a:prstGeom prst="rect">
+            <a:avLst/>
+          </a:prstGeom>
+        </p:spPr>
+      </p:pic>
+      <p:pic>
+        <p:nvPicPr>
+          <p:cNvPr id="9" name="Picture 8"/>
+          <p:cNvPicPr>
+            <a:picLocks noChangeAspect="1"/>
+          </p:cNvPicPr>
+          <p:nvPr/>
+        </p:nvPicPr>
+        <p:blipFill rotWithShape="1">
+          <a:blip r:embed="rId6" cstate="email">
+            <a:extLst>
+              <a:ext uri="{28A0092B-C50C-407E-A947-70E740481C1C}">
+                <a14:useLocalDpi xmlns:a14="http://schemas.microsoft.com/office/drawing/2010/main"/>
+              </a:ext>
+            </a:extLst>
+          </a:blip>
+          <a:srcRect r="13820"/>
+          <a:stretch/>
+        </p:blipFill>
+        <p:spPr>
+          <a:xfrm>
+            <a:off x="683568" y="4969813"/>
+            <a:ext cx="7880342" cy="1555531"/>
+          </a:xfrm>
+          <a:prstGeom prst="rect">
+            <a:avLst/>
+          </a:prstGeom>
+        </p:spPr>
+      </p:pic>
+    </p:spTree>
+    <p:extLst>
+      <p:ext uri="{BB962C8B-B14F-4D97-AF65-F5344CB8AC3E}">
+        <p14:creationId xmlns:p14="http://schemas.microsoft.com/office/powerpoint/2010/main" val="1689324965"/>
+      </p:ext>
+    </p:extLst>
+  </p:cSld>
+  <p:clrMapOvr>
+    <a:masterClrMapping/>
+  </p:clrMapOvr>
+</p:sld>
+</file>
+
+<file path=ppt/slides/slide20.xml><?xml version="1.0" encoding="utf-8"?>
+<p:sld xmlns:a="http://schemas.openxmlformats.org/drawingml/2006/main" xmlns:r="http://schemas.openxmlformats.org/officeDocument/2006/relationships" xmlns:p="http://schemas.openxmlformats.org/presentationml/2006/main">
+  <p:cSld>
+    <p:spTree>
+      <p:nvGrpSpPr>
+        <p:cNvPr id="1" name=""/>
+        <p:cNvGrpSpPr/>
+        <p:nvPr/>
+      </p:nvGrpSpPr>
+      <p:grpSpPr>
+        <a:xfrm>
+          <a:off x="0" y="0"/>
+          <a:ext cx="0" cy="0"/>
+          <a:chOff x="0" y="0"/>
+          <a:chExt cx="0" cy="0"/>
+        </a:xfrm>
+      </p:grpSpPr>
+      <p:sp>
+        <p:nvSpPr>
           <p:cNvPr id="18" name="1 Título"/>
           <p:cNvSpPr>
             <a:spLocks noGrp="1"/>
@@ -10120,23 +10786,25 @@
         </p:nvSpPr>
         <p:spPr>
           <a:xfrm>
-            <a:off x="457200" y="160885"/>
+            <a:off x="457200" y="162000"/>
             <a:ext cx="8229600" cy="792088"/>
           </a:xfrm>
         </p:spPr>
         <p:txBody>
-          <a:bodyPr/>
+          <a:bodyPr>
+            <a:normAutofit fontScale="90000"/>
+          </a:bodyPr>
           <a:lstStyle/>
           <a:p>
             <a:r>
-              <a:rPr lang="es-PE" dirty="0" smtClean="0">
+              <a:rPr lang="es-PE" sz="4800" dirty="0" smtClean="0">
                 <a:solidFill>
                   <a:srgbClr val="FF0000"/>
                 </a:solidFill>
               </a:rPr>
-              <a:t>Objetivos</a:t>
-            </a:r>
-            <a:endParaRPr lang="es-PE" dirty="0">
+              <a:t>Reglas</a:t>
+            </a:r>
+            <a:endParaRPr lang="es-PE" sz="4800" dirty="0">
               <a:solidFill>
                 <a:srgbClr val="FF0000"/>
               </a:solidFill>
@@ -10146,7 +10814,7 @@
       </p:sp>
       <p:sp>
         <p:nvSpPr>
-          <p:cNvPr id="9" name="8 CuadroTexto"/>
+          <p:cNvPr id="2" name="1 CuadroTexto"/>
           <p:cNvSpPr txBox="1"/>
           <p:nvPr>
             <p:custDataLst>
@@ -10156,8 +10824,8 @@
         </p:nvSpPr>
         <p:spPr>
           <a:xfrm>
-            <a:off x="294033" y="1155516"/>
-            <a:ext cx="8568951" cy="3785652"/>
+            <a:off x="251520" y="908720"/>
+            <a:ext cx="8640960" cy="1569660"/>
           </a:xfrm>
           <a:prstGeom prst="rect">
             <a:avLst/>
@@ -10170,78 +10838,107 @@
           </a:bodyPr>
           <a:lstStyle/>
           <a:p>
-            <a:pPr marL="457200" indent="-457200">
-              <a:buFont typeface="Arial"/>
-              <a:buChar char="•"/>
-            </a:pPr>
-            <a:r>
-              <a:rPr lang="es-PE" sz="3000" dirty="0" smtClean="0"/>
-              <a:t>Aprender </a:t>
-            </a:r>
-            <a:r>
-              <a:rPr lang="es-PE" sz="3000" dirty="0"/>
-              <a:t>y compartir diversas técnicas de refactorización</a:t>
-            </a:r>
-            <a:r>
-              <a:rPr lang="es-PE" sz="3000" dirty="0" smtClean="0"/>
-              <a:t>.</a:t>
-            </a:r>
-          </a:p>
-          <a:p>
-            <a:pPr marL="457200" indent="-457200">
-              <a:buFont typeface="Arial"/>
-              <a:buChar char="•"/>
-            </a:pPr>
-            <a:endParaRPr lang="es-PE" sz="3000" dirty="0"/>
-          </a:p>
-          <a:p>
-            <a:pPr marL="457200" indent="-457200">
-              <a:buFont typeface="Arial"/>
-              <a:buChar char="•"/>
-            </a:pPr>
-            <a:r>
-              <a:rPr lang="es-PE" sz="3000" dirty="0" smtClean="0"/>
-              <a:t>Experimentar </a:t>
-            </a:r>
-            <a:r>
-              <a:rPr lang="es-PE" sz="3000" dirty="0"/>
-              <a:t>la refactorización mientras se aplica de forma correcta y disciplinada</a:t>
-            </a:r>
-            <a:r>
-              <a:rPr lang="es-PE" sz="3000" dirty="0" smtClean="0"/>
-              <a:t>.</a:t>
-            </a:r>
-          </a:p>
-          <a:p>
-            <a:pPr marL="457200" indent="-457200">
-              <a:buFont typeface="Arial"/>
-              <a:buChar char="•"/>
-            </a:pPr>
-            <a:endParaRPr lang="es-PE" sz="3000" dirty="0"/>
-          </a:p>
-          <a:p>
-            <a:pPr marL="457200" indent="-457200">
-              <a:buFont typeface="Arial"/>
-              <a:buChar char="•"/>
-            </a:pPr>
-            <a:r>
-              <a:rPr lang="es-PE" sz="3000" dirty="0" smtClean="0"/>
-              <a:t>Familiarizarse </a:t>
-            </a:r>
-            <a:r>
-              <a:rPr lang="es-PE" sz="3000" dirty="0"/>
-              <a:t>y ver los beneficios de los refactorings automatizados que proveen los IDES.</a:t>
-            </a:r>
-          </a:p>
-        </p:txBody>
-      </p:sp>
+            <a:pPr algn="ctr"/>
+            <a:r>
+              <a:rPr lang="es-PE" sz="3200" dirty="0" smtClean="0"/>
+              <a:t>Es un juego de </a:t>
+            </a:r>
+            <a:r>
+              <a:rPr lang="es-PE" sz="3200" dirty="0" smtClean="0"/>
+              <a:t>4 </a:t>
+            </a:r>
+            <a:r>
+              <a:rPr lang="es-PE" sz="3200" dirty="0" smtClean="0"/>
+              <a:t>hoyos, todos los equipos comenzarán en el tee y en los siguientes hoyos de manera simultanea.</a:t>
+            </a:r>
+          </a:p>
+        </p:txBody>
+      </p:sp>
+      <p:sp>
+        <p:nvSpPr>
+          <p:cNvPr id="3" name="2 Rectángulo"/>
+          <p:cNvSpPr/>
+          <p:nvPr>
+            <p:custDataLst>
+              <p:tags r:id="rId4"/>
+            </p:custDataLst>
+          </p:nvPr>
+        </p:nvSpPr>
+        <p:spPr>
+          <a:xfrm>
+            <a:off x="251520" y="5580528"/>
+            <a:ext cx="8640960" cy="584776"/>
+          </a:xfrm>
+          <a:prstGeom prst="rect">
+            <a:avLst/>
+          </a:prstGeom>
+        </p:spPr>
+        <p:txBody>
+          <a:bodyPr wrap="square">
+            <a:spAutoFit/>
+          </a:bodyPr>
+          <a:lstStyle/>
+          <a:p>
+            <a:pPr algn="ctr"/>
+            <a:r>
+              <a:rPr lang="es-PE" sz="3200" dirty="0" smtClean="0"/>
+              <a:t>El tiempo </a:t>
+            </a:r>
+            <a:r>
+              <a:rPr lang="es-PE" sz="3200" dirty="0" smtClean="0"/>
+              <a:t>de ejecuci</a:t>
+            </a:r>
+            <a:r>
+              <a:rPr lang="es-PE" sz="3200" dirty="0" smtClean="0"/>
+              <a:t>ón </a:t>
+            </a:r>
+            <a:r>
+              <a:rPr lang="es-PE" sz="3200" dirty="0" smtClean="0"/>
+              <a:t>por </a:t>
+            </a:r>
+            <a:r>
+              <a:rPr lang="es-PE" sz="3200" dirty="0" smtClean="0"/>
+              <a:t>hoyo es </a:t>
+            </a:r>
+            <a:r>
+              <a:rPr lang="es-PE" sz="3200" dirty="0" smtClean="0"/>
+              <a:t>10 minutos</a:t>
+            </a:r>
+            <a:endParaRPr lang="es-PE" sz="3200" dirty="0"/>
+          </a:p>
+        </p:txBody>
+      </p:sp>
+      <p:pic>
+        <p:nvPicPr>
+          <p:cNvPr id="4" name="Picture 3"/>
+          <p:cNvPicPr>
+            <a:picLocks noChangeAspect="1"/>
+          </p:cNvPicPr>
+          <p:nvPr/>
+        </p:nvPicPr>
+        <p:blipFill>
+          <a:blip r:embed="rId7"/>
+          <a:stretch>
+            <a:fillRect/>
+          </a:stretch>
+        </p:blipFill>
+        <p:spPr>
+          <a:xfrm>
+            <a:off x="3059832" y="2771735"/>
+            <a:ext cx="3024336" cy="2745497"/>
+          </a:xfrm>
+          <a:prstGeom prst="rect">
+            <a:avLst/>
+          </a:prstGeom>
+        </p:spPr>
+      </p:pic>
     </p:spTree>
     <p:custDataLst>
       <p:tags r:id="rId1"/>
     </p:custDataLst>
     <p:extLst>
       <p:ext uri="{BB962C8B-B14F-4D97-AF65-F5344CB8AC3E}">
-        <p14:creationId xmlns:p14="http://schemas.microsoft.com/office/powerpoint/2010/main" val="3484589936"/>
+        <p14:creationId xmlns:p14="http://schemas.microsoft.com/office/powerpoint/2010/main" val="3539184923"/>
       </p:ext>
     </p:extLst>
   </p:cSld>
@@ -10258,7 +10955,141 @@
 </p:sld>
 </file>
 
-<file path=ppt/slides/slide20.xml><?xml version="1.0" encoding="utf-8"?>
+<file path=ppt/slides/slide21.xml><?xml version="1.0" encoding="utf-8"?>
+<p:sld xmlns:a="http://schemas.openxmlformats.org/drawingml/2006/main" xmlns:r="http://schemas.openxmlformats.org/officeDocument/2006/relationships" xmlns:p="http://schemas.openxmlformats.org/presentationml/2006/main">
+  <p:cSld>
+    <p:spTree>
+      <p:nvGrpSpPr>
+        <p:cNvPr id="1" name=""/>
+        <p:cNvGrpSpPr/>
+        <p:nvPr/>
+      </p:nvGrpSpPr>
+      <p:grpSpPr>
+        <a:xfrm>
+          <a:off x="0" y="0"/>
+          <a:ext cx="0" cy="0"/>
+          <a:chOff x="0" y="0"/>
+          <a:chExt cx="0" cy="0"/>
+        </a:xfrm>
+      </p:grpSpPr>
+      <p:sp>
+        <p:nvSpPr>
+          <p:cNvPr id="5" name="1 Título"/>
+          <p:cNvSpPr>
+            <a:spLocks noGrp="1"/>
+          </p:cNvSpPr>
+          <p:nvPr>
+            <p:ph type="title"/>
+          </p:nvPr>
+        </p:nvSpPr>
+        <p:spPr>
+          <a:xfrm>
+            <a:off x="503220" y="332656"/>
+            <a:ext cx="8229600" cy="720080"/>
+          </a:xfrm>
+        </p:spPr>
+        <p:txBody>
+          <a:bodyPr vert="horz" lIns="91440" tIns="45720" rIns="91440" bIns="45720" rtlCol="0" anchor="ctr">
+            <a:normAutofit fontScale="90000"/>
+          </a:bodyPr>
+          <a:lstStyle/>
+          <a:p>
+            <a:r>
+              <a:rPr lang="es-PE" sz="4800" dirty="0">
+                <a:solidFill>
+                  <a:srgbClr val="FF0000"/>
+                </a:solidFill>
+              </a:rPr>
+              <a:t>Próximos Pasos</a:t>
+            </a:r>
+          </a:p>
+        </p:txBody>
+      </p:sp>
+      <p:sp>
+        <p:nvSpPr>
+          <p:cNvPr id="6" name="2 Marcador de contenido"/>
+          <p:cNvSpPr>
+            <a:spLocks noGrp="1"/>
+          </p:cNvSpPr>
+          <p:nvPr>
+            <p:ph idx="1"/>
+          </p:nvPr>
+        </p:nvSpPr>
+        <p:spPr>
+          <a:xfrm>
+            <a:off x="627641" y="1556792"/>
+            <a:ext cx="7980759" cy="4154984"/>
+          </a:xfrm>
+          <a:noFill/>
+        </p:spPr>
+        <p:txBody>
+          <a:bodyPr wrap="square" rtlCol="0">
+            <a:spAutoFit/>
+          </a:bodyPr>
+          <a:lstStyle/>
+          <a:p>
+            <a:pPr marL="0" algn="ctr" defTabSz="914400"/>
+            <a:r>
+              <a:rPr lang="es-PE" sz="4000" dirty="0"/>
+              <a:t>Practiquen este u otro Kata en su casa.</a:t>
+            </a:r>
+          </a:p>
+          <a:p>
+            <a:pPr marL="0" indent="0" algn="ctr" defTabSz="914400">
+              <a:buNone/>
+            </a:pPr>
+            <a:endParaRPr lang="es-PE" sz="4000" dirty="0"/>
+          </a:p>
+          <a:p>
+            <a:pPr marL="0" algn="ctr" defTabSz="914400"/>
+            <a:r>
+              <a:rPr lang="es-PE" sz="4000" dirty="0"/>
+              <a:t>Organicen sus propios </a:t>
+            </a:r>
+            <a:r>
+              <a:rPr lang="es-PE" sz="4000" dirty="0" smtClean="0"/>
+              <a:t>Dojos en </a:t>
+            </a:r>
+            <a:r>
+              <a:rPr lang="es-PE" sz="4000" dirty="0"/>
+              <a:t>su trabajo o comunidad. </a:t>
+            </a:r>
+          </a:p>
+          <a:p>
+            <a:pPr marL="0" indent="0" algn="ctr" defTabSz="914400">
+              <a:buNone/>
+            </a:pPr>
+            <a:r>
+              <a:rPr lang="es-PE" sz="4000" dirty="0"/>
+              <a:t>(pueden utilizar esta presentación)</a:t>
+            </a:r>
+          </a:p>
+        </p:txBody>
+      </p:sp>
+    </p:spTree>
+    <p:custDataLst>
+      <p:tags r:id="rId1"/>
+    </p:custDataLst>
+    <p:extLst>
+      <p:ext uri="{BB962C8B-B14F-4D97-AF65-F5344CB8AC3E}">
+        <p14:creationId xmlns:p14="http://schemas.microsoft.com/office/powerpoint/2010/main" val="2616784292"/>
+      </p:ext>
+    </p:extLst>
+  </p:cSld>
+  <p:clrMapOvr>
+    <a:masterClrMapping/>
+  </p:clrMapOvr>
+  <p:timing>
+    <p:tnLst>
+      <p:par>
+        <p:cTn xmlns:p14="http://schemas.microsoft.com/office/powerpoint/2010/main" id="1" dur="indefinite" restart="never" nodeType="tmRoot"/>
+      </p:par>
+    </p:tnLst>
+  </p:timing>
+</p:sld>
+</file>
+
+<file path=ppt/slides/slide22.xml><?xml version="1.0" encoding="utf-8"?>
 <p:sld xmlns:a="http://schemas.openxmlformats.org/drawingml/2006/main" xmlns:r="http://schemas.openxmlformats.org/officeDocument/2006/relationships" xmlns:p="http://schemas.openxmlformats.org/presentationml/2006/main">
   <p:cSld>
     <p:spTree>
@@ -10524,7 +11355,7 @@
 </p:sld>
 </file>
 
-<file path=ppt/slides/slide21.xml><?xml version="1.0" encoding="utf-8"?>
+<file path=ppt/slides/slide23.xml><?xml version="1.0" encoding="utf-8"?>
 <p:sld xmlns:a="http://schemas.openxmlformats.org/drawingml/2006/main" xmlns:r="http://schemas.openxmlformats.org/officeDocument/2006/relationships" xmlns:p="http://schemas.openxmlformats.org/presentationml/2006/main">
   <p:cSld>
     <p:spTree>
@@ -10738,6 +11569,176 @@
                   <a:srgbClr val="FF0000"/>
                 </a:solidFill>
               </a:rPr>
+              <a:t>Objetivos</a:t>
+            </a:r>
+            <a:endParaRPr lang="es-PE" dirty="0">
+              <a:solidFill>
+                <a:srgbClr val="FF0000"/>
+              </a:solidFill>
+            </a:endParaRPr>
+          </a:p>
+        </p:txBody>
+      </p:sp>
+      <p:sp>
+        <p:nvSpPr>
+          <p:cNvPr id="9" name="8 CuadroTexto"/>
+          <p:cNvSpPr txBox="1"/>
+          <p:nvPr>
+            <p:custDataLst>
+              <p:tags r:id="rId3"/>
+            </p:custDataLst>
+          </p:nvPr>
+        </p:nvSpPr>
+        <p:spPr>
+          <a:xfrm>
+            <a:off x="294033" y="1155516"/>
+            <a:ext cx="8568951" cy="3785652"/>
+          </a:xfrm>
+          <a:prstGeom prst="rect">
+            <a:avLst/>
+          </a:prstGeom>
+          <a:noFill/>
+        </p:spPr>
+        <p:txBody>
+          <a:bodyPr wrap="square" rtlCol="0">
+            <a:spAutoFit/>
+          </a:bodyPr>
+          <a:lstStyle/>
+          <a:p>
+            <a:pPr marL="457200" indent="-457200">
+              <a:buFont typeface="Arial"/>
+              <a:buChar char="•"/>
+            </a:pPr>
+            <a:r>
+              <a:rPr lang="es-PE" sz="3000" dirty="0" smtClean="0"/>
+              <a:t>Aprender </a:t>
+            </a:r>
+            <a:r>
+              <a:rPr lang="es-PE" sz="3000" dirty="0"/>
+              <a:t>y compartir diversas técnicas de refactorización</a:t>
+            </a:r>
+            <a:r>
+              <a:rPr lang="es-PE" sz="3000" dirty="0" smtClean="0"/>
+              <a:t>.</a:t>
+            </a:r>
+          </a:p>
+          <a:p>
+            <a:pPr marL="457200" indent="-457200">
+              <a:buFont typeface="Arial"/>
+              <a:buChar char="•"/>
+            </a:pPr>
+            <a:endParaRPr lang="es-PE" sz="3000" dirty="0"/>
+          </a:p>
+          <a:p>
+            <a:pPr marL="457200" indent="-457200">
+              <a:buFont typeface="Arial"/>
+              <a:buChar char="•"/>
+            </a:pPr>
+            <a:r>
+              <a:rPr lang="es-PE" sz="3000" dirty="0" smtClean="0"/>
+              <a:t>Experimentar </a:t>
+            </a:r>
+            <a:r>
+              <a:rPr lang="es-PE" sz="3000" dirty="0"/>
+              <a:t>la refactorización mientras se aplica de forma correcta y disciplinada</a:t>
+            </a:r>
+            <a:r>
+              <a:rPr lang="es-PE" sz="3000" dirty="0" smtClean="0"/>
+              <a:t>.</a:t>
+            </a:r>
+          </a:p>
+          <a:p>
+            <a:pPr marL="457200" indent="-457200">
+              <a:buFont typeface="Arial"/>
+              <a:buChar char="•"/>
+            </a:pPr>
+            <a:endParaRPr lang="es-PE" sz="3000" dirty="0"/>
+          </a:p>
+          <a:p>
+            <a:pPr marL="457200" indent="-457200">
+              <a:buFont typeface="Arial"/>
+              <a:buChar char="•"/>
+            </a:pPr>
+            <a:r>
+              <a:rPr lang="es-PE" sz="3000" dirty="0" smtClean="0"/>
+              <a:t>Familiarizarse </a:t>
+            </a:r>
+            <a:r>
+              <a:rPr lang="es-PE" sz="3000" dirty="0"/>
+              <a:t>y ver los beneficios de los refactorings automatizados que proveen los IDES.</a:t>
+            </a:r>
+          </a:p>
+        </p:txBody>
+      </p:sp>
+    </p:spTree>
+    <p:custDataLst>
+      <p:tags r:id="rId1"/>
+    </p:custDataLst>
+    <p:extLst>
+      <p:ext uri="{BB962C8B-B14F-4D97-AF65-F5344CB8AC3E}">
+        <p14:creationId xmlns:p14="http://schemas.microsoft.com/office/powerpoint/2010/main" val="3484589936"/>
+      </p:ext>
+    </p:extLst>
+  </p:cSld>
+  <p:clrMapOvr>
+    <a:masterClrMapping/>
+  </p:clrMapOvr>
+  <p:timing>
+    <p:tnLst>
+      <p:par>
+        <p:cTn xmlns:p14="http://schemas.microsoft.com/office/powerpoint/2010/main" id="1" dur="indefinite" restart="never" nodeType="tmRoot"/>
+      </p:par>
+    </p:tnLst>
+  </p:timing>
+</p:sld>
+</file>
+
+<file path=ppt/slides/slide4.xml><?xml version="1.0" encoding="utf-8"?>
+<p:sld xmlns:a="http://schemas.openxmlformats.org/drawingml/2006/main" xmlns:r="http://schemas.openxmlformats.org/officeDocument/2006/relationships" xmlns:p="http://schemas.openxmlformats.org/presentationml/2006/main">
+  <p:cSld>
+    <p:spTree>
+      <p:nvGrpSpPr>
+        <p:cNvPr id="1" name=""/>
+        <p:cNvGrpSpPr/>
+        <p:nvPr/>
+      </p:nvGrpSpPr>
+      <p:grpSpPr>
+        <a:xfrm>
+          <a:off x="0" y="0"/>
+          <a:ext cx="0" cy="0"/>
+          <a:chOff x="0" y="0"/>
+          <a:chExt cx="0" cy="0"/>
+        </a:xfrm>
+      </p:grpSpPr>
+      <p:sp>
+        <p:nvSpPr>
+          <p:cNvPr id="18" name="1 Título"/>
+          <p:cNvSpPr>
+            <a:spLocks noGrp="1"/>
+          </p:cNvSpPr>
+          <p:nvPr>
+            <p:ph type="title"/>
+            <p:custDataLst>
+              <p:tags r:id="rId2"/>
+            </p:custDataLst>
+          </p:nvPr>
+        </p:nvSpPr>
+        <p:spPr>
+          <a:xfrm>
+            <a:off x="457200" y="160885"/>
+            <a:ext cx="8229600" cy="792088"/>
+          </a:xfrm>
+        </p:spPr>
+        <p:txBody>
+          <a:bodyPr/>
+          <a:lstStyle/>
+          <a:p>
+            <a:r>
+              <a:rPr lang="es-PE" dirty="0" smtClean="0">
+                <a:solidFill>
+                  <a:srgbClr val="FF0000"/>
+                </a:solidFill>
+              </a:rPr>
               <a:t>Descripción</a:t>
             </a:r>
             <a:endParaRPr lang="es-PE" dirty="0">
@@ -10859,7 +11860,7 @@
 </p:sld>
 </file>
 
-<file path=ppt/slides/slide4.xml><?xml version="1.0" encoding="utf-8"?>
+<file path=ppt/slides/slide5.xml><?xml version="1.0" encoding="utf-8"?>
 <p:sld xmlns:a="http://schemas.openxmlformats.org/drawingml/2006/main" xmlns:r="http://schemas.openxmlformats.org/officeDocument/2006/relationships" xmlns:p="http://schemas.openxmlformats.org/presentationml/2006/main">
   <p:cSld>
     <p:spTree>
@@ -11103,7 +12104,7 @@
 </p:sld>
 </file>
 
-<file path=ppt/slides/slide5.xml><?xml version="1.0" encoding="utf-8"?>
+<file path=ppt/slides/slide6.xml><?xml version="1.0" encoding="utf-8"?>
 <p:sld xmlns:a="http://schemas.openxmlformats.org/drawingml/2006/main" xmlns:r="http://schemas.openxmlformats.org/officeDocument/2006/relationships" xmlns:p="http://schemas.openxmlformats.org/presentationml/2006/main">
   <p:cSld>
     <p:spTree>
@@ -11313,7 +12314,7 @@
 </p:sld>
 </file>
 
-<file path=ppt/slides/slide6.xml><?xml version="1.0" encoding="utf-8"?>
+<file path=ppt/slides/slide7.xml><?xml version="1.0" encoding="utf-8"?>
 <p:sld xmlns:a="http://schemas.openxmlformats.org/drawingml/2006/main" xmlns:r="http://schemas.openxmlformats.org/officeDocument/2006/relationships" xmlns:p="http://schemas.openxmlformats.org/presentationml/2006/main">
   <p:cSld>
     <p:spTree>
@@ -11542,7 +12543,7 @@
 </p:sld>
 </file>
 
-<file path=ppt/slides/slide7.xml><?xml version="1.0" encoding="utf-8"?>
+<file path=ppt/slides/slide8.xml><?xml version="1.0" encoding="utf-8"?>
 <p:sld xmlns:a="http://schemas.openxmlformats.org/drawingml/2006/main" xmlns:r="http://schemas.openxmlformats.org/officeDocument/2006/relationships" xmlns:p="http://schemas.openxmlformats.org/presentationml/2006/main">
   <p:cSld>
     <p:spTree>
@@ -11750,7 +12751,7 @@
 </p:sld>
 </file>
 
-<file path=ppt/slides/slide8.xml><?xml version="1.0" encoding="utf-8"?>
+<file path=ppt/slides/slide9.xml><?xml version="1.0" encoding="utf-8"?>
 <p:sld xmlns:a="http://schemas.openxmlformats.org/drawingml/2006/main" xmlns:r="http://schemas.openxmlformats.org/officeDocument/2006/relationships" xmlns:p="http://schemas.openxmlformats.org/presentationml/2006/main">
   <p:cSld>
     <p:spTree>
@@ -11847,7 +12848,7 @@
             </a:br>
             <a:r>
               <a:rPr lang="es-PE" sz="2800" dirty="0" smtClean="0"/>
-              <a:t>(El código se encuentra en VS2010 y Eclipse)</a:t>
+              <a:t>(El código se encuentra en VS2012 y Eclipse)</a:t>
             </a:r>
           </a:p>
           <a:p>
@@ -11996,225 +12997,6 @@
     <p:extLst>
       <p:ext uri="{BB962C8B-B14F-4D97-AF65-F5344CB8AC3E}">
         <p14:creationId xmlns:p14="http://schemas.microsoft.com/office/powerpoint/2010/main" val="1571014780"/>
-      </p:ext>
-    </p:extLst>
-  </p:cSld>
-  <p:clrMapOvr>
-    <a:masterClrMapping/>
-  </p:clrMapOvr>
-  <p:timing>
-    <p:tnLst>
-      <p:par>
-        <p:cTn xmlns:p14="http://schemas.microsoft.com/office/powerpoint/2010/main" id="1" dur="indefinite" restart="never" nodeType="tmRoot"/>
-      </p:par>
-    </p:tnLst>
-  </p:timing>
-</p:sld>
-</file>
-
-<file path=ppt/slides/slide9.xml><?xml version="1.0" encoding="utf-8"?>
-<p:sld xmlns:a="http://schemas.openxmlformats.org/drawingml/2006/main" xmlns:r="http://schemas.openxmlformats.org/officeDocument/2006/relationships" xmlns:p="http://schemas.openxmlformats.org/presentationml/2006/main">
-  <p:cSld>
-    <p:spTree>
-      <p:nvGrpSpPr>
-        <p:cNvPr id="1" name=""/>
-        <p:cNvGrpSpPr/>
-        <p:nvPr/>
-      </p:nvGrpSpPr>
-      <p:grpSpPr>
-        <a:xfrm>
-          <a:off x="0" y="0"/>
-          <a:ext cx="0" cy="0"/>
-          <a:chOff x="0" y="0"/>
-          <a:chExt cx="0" cy="0"/>
-        </a:xfrm>
-      </p:grpSpPr>
-      <p:sp>
-        <p:nvSpPr>
-          <p:cNvPr id="18" name="1 Título"/>
-          <p:cNvSpPr>
-            <a:spLocks noGrp="1"/>
-          </p:cNvSpPr>
-          <p:nvPr>
-            <p:ph type="title"/>
-            <p:custDataLst>
-              <p:tags r:id="rId2"/>
-            </p:custDataLst>
-          </p:nvPr>
-        </p:nvSpPr>
-        <p:spPr>
-          <a:xfrm>
-            <a:off x="457200" y="160885"/>
-            <a:ext cx="8229600" cy="792088"/>
-          </a:xfrm>
-        </p:spPr>
-        <p:txBody>
-          <a:bodyPr/>
-          <a:lstStyle/>
-          <a:p>
-            <a:r>
-              <a:rPr lang="es-PE" dirty="0" smtClean="0">
-                <a:solidFill>
-                  <a:srgbClr val="FF0000"/>
-                </a:solidFill>
-              </a:rPr>
-              <a:t>Puntaje</a:t>
-            </a:r>
-            <a:endParaRPr lang="es-PE" dirty="0">
-              <a:solidFill>
-                <a:srgbClr val="FF0000"/>
-              </a:solidFill>
-            </a:endParaRPr>
-          </a:p>
-        </p:txBody>
-      </p:sp>
-      <p:sp>
-        <p:nvSpPr>
-          <p:cNvPr id="2" name="1 CuadroTexto"/>
-          <p:cNvSpPr txBox="1"/>
-          <p:nvPr>
-            <p:custDataLst>
-              <p:tags r:id="rId3"/>
-            </p:custDataLst>
-          </p:nvPr>
-        </p:nvSpPr>
-        <p:spPr>
-          <a:xfrm>
-            <a:off x="251520" y="879224"/>
-            <a:ext cx="8712968" cy="4939814"/>
-          </a:xfrm>
-          <a:prstGeom prst="rect">
-            <a:avLst/>
-          </a:prstGeom>
-          <a:noFill/>
-        </p:spPr>
-        <p:txBody>
-          <a:bodyPr wrap="square" rtlCol="0">
-            <a:spAutoFit/>
-          </a:bodyPr>
-          <a:lstStyle/>
-          <a:p>
-            <a:pPr algn="ctr"/>
-            <a:r>
-              <a:rPr lang="es-PE" sz="3500" dirty="0" smtClean="0">
-                <a:solidFill>
-                  <a:srgbClr val="00823B"/>
-                </a:solidFill>
-              </a:rPr>
-              <a:t>General</a:t>
-            </a:r>
-          </a:p>
-          <a:p>
-            <a:r>
-              <a:rPr lang="es-PE" sz="3500" dirty="0" smtClean="0"/>
-              <a:t>+</a:t>
-            </a:r>
-            <a:r>
-              <a:rPr lang="es-PE" sz="3500" dirty="0"/>
-              <a:t>1 </a:t>
-            </a:r>
-            <a:r>
-              <a:rPr lang="es-PE" sz="3500" dirty="0" smtClean="0"/>
-              <a:t>Cada refactorización</a:t>
-            </a:r>
-          </a:p>
-          <a:p>
-            <a:r>
-              <a:rPr lang="es-PE" sz="3500" dirty="0" smtClean="0"/>
-              <a:t>+</a:t>
-            </a:r>
-            <a:r>
-              <a:rPr lang="es-PE" sz="3500" dirty="0"/>
-              <a:t>1 Copiar + </a:t>
-            </a:r>
-            <a:r>
-              <a:rPr lang="es-PE" sz="3500" dirty="0" smtClean="0"/>
-              <a:t>Pegar</a:t>
-            </a:r>
-          </a:p>
-          <a:p>
-            <a:r>
-              <a:rPr lang="es-PE" sz="3500" dirty="0"/>
-              <a:t>+1 </a:t>
-            </a:r>
-            <a:r>
-              <a:rPr lang="es-PE" sz="3500" dirty="0" smtClean="0"/>
-              <a:t>Cualquier shortcut </a:t>
-            </a:r>
-            <a:r>
-              <a:rPr lang="es-PE" sz="3500" dirty="0"/>
-              <a:t>de edición </a:t>
-            </a:r>
-            <a:r>
-              <a:rPr lang="es-PE" sz="3500" dirty="0" smtClean="0"/>
-              <a:t>código</a:t>
-            </a:r>
-          </a:p>
-          <a:p>
-            <a:r>
-              <a:rPr lang="es-PE" sz="3500" dirty="0" smtClean="0"/>
-              <a:t>+1 Eliminar una l</a:t>
-            </a:r>
-            <a:r>
-              <a:rPr lang="es-PE" sz="3500" dirty="0" smtClean="0"/>
-              <a:t>ínea con código</a:t>
-            </a:r>
-            <a:endParaRPr lang="es-PE" sz="3500" dirty="0" smtClean="0"/>
-          </a:p>
-          <a:p>
-            <a:r>
-              <a:rPr lang="es-PE" sz="3500" dirty="0" smtClean="0"/>
-              <a:t>+1 Crear clases, interfaces o variables</a:t>
-            </a:r>
-            <a:endParaRPr lang="es-PE" sz="3500" dirty="0" smtClean="0"/>
-          </a:p>
-          <a:p>
-            <a:pPr marL="633413" indent="-633413"/>
-            <a:r>
-              <a:rPr lang="es-PE" sz="3500" dirty="0" smtClean="0"/>
-              <a:t>+</a:t>
-            </a:r>
-            <a:r>
-              <a:rPr lang="es-PE" sz="3500" dirty="0"/>
-              <a:t>0 </a:t>
-            </a:r>
-            <a:r>
-              <a:rPr lang="es-PE" sz="3500" dirty="0" smtClean="0"/>
-              <a:t>Dar formato o eliminar líneas en blanco</a:t>
-            </a:r>
-          </a:p>
-          <a:p>
-            <a:pPr marL="633413" indent="-633413"/>
-            <a:r>
-              <a:rPr lang="es-PE" sz="3500" dirty="0" smtClean="0"/>
-              <a:t>+0 Cambiar el acceso de los métodos o </a:t>
-            </a:r>
-            <a:r>
-              <a:rPr lang="es-PE" sz="3500" dirty="0" smtClean="0"/>
-              <a:t>clases</a:t>
-            </a:r>
-          </a:p>
-          <a:p>
-            <a:pPr marL="633413" indent="-633413"/>
-            <a:r>
-              <a:rPr lang="es-PE" sz="3500" dirty="0" smtClean="0"/>
-              <a:t>+0 Cambiar un m</a:t>
-            </a:r>
-            <a:r>
-              <a:rPr lang="es-PE" sz="3500" dirty="0" smtClean="0"/>
-              <a:t>étodo a estático y viceversa</a:t>
-            </a:r>
-            <a:endParaRPr lang="es-PE" sz="3500" dirty="0" smtClean="0"/>
-          </a:p>
-        </p:txBody>
-      </p:sp>
-    </p:spTree>
-    <p:custDataLst>
-      <p:tags r:id="rId1"/>
-    </p:custDataLst>
-    <p:extLst>
-      <p:ext uri="{BB962C8B-B14F-4D97-AF65-F5344CB8AC3E}">
-        <p14:creationId xmlns:p14="http://schemas.microsoft.com/office/powerpoint/2010/main" val="1848309971"/>
       </p:ext>
     </p:extLst>
   </p:cSld>
@@ -12389,19 +13171,19 @@
 
 <file path=ppt/tags/tag33.xml><?xml version="1.0" encoding="utf-8"?>
 <p:tagLst xmlns:a="http://schemas.openxmlformats.org/drawingml/2006/main" xmlns:r="http://schemas.openxmlformats.org/officeDocument/2006/relationships" xmlns:p="http://schemas.openxmlformats.org/presentationml/2006/main">
-  <p:tag name="DVSECTIONID" val="YfG4E73kWElduy0UjbxFmN"/>
+  <p:tag name="DVSECTIONID" val="yhVriMrcMxMBEvBfJ6iNZl"/>
 </p:tagLst>
 </file>
 
 <file path=ppt/tags/tag34.xml><?xml version="1.0" encoding="utf-8"?>
 <p:tagLst xmlns:a="http://schemas.openxmlformats.org/drawingml/2006/main" xmlns:r="http://schemas.openxmlformats.org/officeDocument/2006/relationships" xmlns:p="http://schemas.openxmlformats.org/presentationml/2006/main">
-  <p:tag name="DVSHAPEID" val="eh04WSBvw0QEXlYejESuDS"/>
+  <p:tag name="DVSHAPEID" val="90uPZmUu51RrS53OLUCh6h"/>
 </p:tagLst>
 </file>
 
 <file path=ppt/tags/tag35.xml><?xml version="1.0" encoding="utf-8"?>
 <p:tagLst xmlns:a="http://schemas.openxmlformats.org/drawingml/2006/main" xmlns:r="http://schemas.openxmlformats.org/officeDocument/2006/relationships" xmlns:p="http://schemas.openxmlformats.org/presentationml/2006/main">
-  <p:tag name="DVSHAPEID" val="JpO4dpMeMP8Ctq8I8ErinR"/>
+  <p:tag name="DVSHAPEID" val="hSI7X2B6ytEOPMiuY9hrrg"/>
 </p:tagLst>
 </file>
 
@@ -12419,7 +13201,7 @@
 
 <file path=ppt/tags/tag38.xml><?xml version="1.0" encoding="utf-8"?>
 <p:tagLst xmlns:a="http://schemas.openxmlformats.org/drawingml/2006/main" xmlns:r="http://schemas.openxmlformats.org/officeDocument/2006/relationships" xmlns:p="http://schemas.openxmlformats.org/presentationml/2006/main">
-  <p:tag name="DVSHAPEID" val="HwlSQDv3HCKlxAgSFcJie0"/>
+  <p:tag name="DVSHAPEID" val="JpO4dpMeMP8Ctq8I8ErinR"/>
 </p:tagLst>
 </file>
 
@@ -12485,13 +13267,13 @@
 
 <file path=ppt/tags/tag48.xml><?xml version="1.0" encoding="utf-8"?>
 <p:tagLst xmlns:a="http://schemas.openxmlformats.org/drawingml/2006/main" xmlns:r="http://schemas.openxmlformats.org/officeDocument/2006/relationships" xmlns:p="http://schemas.openxmlformats.org/presentationml/2006/main">
-  <p:tag name="DVSECTIONID" val="6QaPdUBZCvLe6jwlmKcsxw"/>
+  <p:tag name="DVSECTIONID" val="YfG4E73kWElduy0UjbxFmN"/>
 </p:tagLst>
 </file>
 
 <file path=ppt/tags/tag49.xml><?xml version="1.0" encoding="utf-8"?>
 <p:tagLst xmlns:a="http://schemas.openxmlformats.org/drawingml/2006/main" xmlns:r="http://schemas.openxmlformats.org/officeDocument/2006/relationships" xmlns:p="http://schemas.openxmlformats.org/presentationml/2006/main">
-  <p:tag name="DVSHAPEID" val="3ZrrSBbxeMU7bha5DBZVmc"/>
+  <p:tag name="DVSHAPEID" val="eh04WSBvw0QEXlYejESuDS"/>
 </p:tagLst>
 </file>
 
@@ -12503,61 +13285,61 @@
 
 <file path=ppt/tags/tag50.xml><?xml version="1.0" encoding="utf-8"?>
 <p:tagLst xmlns:a="http://schemas.openxmlformats.org/drawingml/2006/main" xmlns:r="http://schemas.openxmlformats.org/officeDocument/2006/relationships" xmlns:p="http://schemas.openxmlformats.org/presentationml/2006/main">
-  <p:tag name="DVSHAPEID" val="PSNNPDIc0KOBXyNb6c5JvR"/>
+  <p:tag name="DVSHAPEID" val="HwlSQDv3HCKlxAgSFcJie0"/>
 </p:tagLst>
 </file>
 
 <file path=ppt/tags/tag51.xml><?xml version="1.0" encoding="utf-8"?>
 <p:tagLst xmlns:a="http://schemas.openxmlformats.org/drawingml/2006/main" xmlns:r="http://schemas.openxmlformats.org/officeDocument/2006/relationships" xmlns:p="http://schemas.openxmlformats.org/presentationml/2006/main">
-  <p:tag name="DVSECTIONID" val="Tc0IDerxZaJLSWvmvYtXWf"/>
+  <p:tag name="DVSECTIONID" val="6QaPdUBZCvLe6jwlmKcsxw"/>
 </p:tagLst>
 </file>
 
 <file path=ppt/tags/tag52.xml><?xml version="1.0" encoding="utf-8"?>
 <p:tagLst xmlns:a="http://schemas.openxmlformats.org/drawingml/2006/main" xmlns:r="http://schemas.openxmlformats.org/officeDocument/2006/relationships" xmlns:p="http://schemas.openxmlformats.org/presentationml/2006/main">
-  <p:tag name="DVSHAPEID" val="vhGohSKmLnQQazD4MxP1L9"/>
+  <p:tag name="DVSHAPEID" val="3ZrrSBbxeMU7bha5DBZVmc"/>
 </p:tagLst>
 </file>
 
 <file path=ppt/tags/tag53.xml><?xml version="1.0" encoding="utf-8"?>
 <p:tagLst xmlns:a="http://schemas.openxmlformats.org/drawingml/2006/main" xmlns:r="http://schemas.openxmlformats.org/officeDocument/2006/relationships" xmlns:p="http://schemas.openxmlformats.org/presentationml/2006/main">
-  <p:tag name="DVSHAPEID" val="izjBhruNQDHXnv7rmPsDZr"/>
+  <p:tag name="DVSHAPEID" val="PSNNPDIc0KOBXyNb6c5JvR"/>
 </p:tagLst>
 </file>
 
 <file path=ppt/tags/tag54.xml><?xml version="1.0" encoding="utf-8"?>
 <p:tagLst xmlns:a="http://schemas.openxmlformats.org/drawingml/2006/main" xmlns:r="http://schemas.openxmlformats.org/officeDocument/2006/relationships" xmlns:p="http://schemas.openxmlformats.org/presentationml/2006/main">
-  <p:tag name="DVSECTIONID" val="pVSrOL96EEiAWXOuhmy5wA"/>
+  <p:tag name="DVSECTIONID" val="Tc0IDerxZaJLSWvmvYtXWf"/>
 </p:tagLst>
 </file>
 
 <file path=ppt/tags/tag55.xml><?xml version="1.0" encoding="utf-8"?>
 <p:tagLst xmlns:a="http://schemas.openxmlformats.org/drawingml/2006/main" xmlns:r="http://schemas.openxmlformats.org/officeDocument/2006/relationships" xmlns:p="http://schemas.openxmlformats.org/presentationml/2006/main">
-  <p:tag name="DVSHAPEID" val="K7ney2pxUt5mZ64FAjSYwd"/>
+  <p:tag name="DVSHAPEID" val="vhGohSKmLnQQazD4MxP1L9"/>
 </p:tagLst>
 </file>
 
 <file path=ppt/tags/tag56.xml><?xml version="1.0" encoding="utf-8"?>
 <p:tagLst xmlns:a="http://schemas.openxmlformats.org/drawingml/2006/main" xmlns:r="http://schemas.openxmlformats.org/officeDocument/2006/relationships" xmlns:p="http://schemas.openxmlformats.org/presentationml/2006/main">
-  <p:tag name="DVSHAPEID" val="8cb7WkbZz8aQPcd3TsniIe"/>
+  <p:tag name="DVSHAPEID" val="izjBhruNQDHXnv7rmPsDZr"/>
 </p:tagLst>
 </file>
 
 <file path=ppt/tags/tag57.xml><?xml version="1.0" encoding="utf-8"?>
 <p:tagLst xmlns:a="http://schemas.openxmlformats.org/drawingml/2006/main" xmlns:r="http://schemas.openxmlformats.org/officeDocument/2006/relationships" xmlns:p="http://schemas.openxmlformats.org/presentationml/2006/main">
-  <p:tag name="DVSECTIONID" val="ulrzQ0fdZzADN4QbpFoSw5"/>
+  <p:tag name="DVSECTIONID" val="pVSrOL96EEiAWXOuhmy5wA"/>
 </p:tagLst>
 </file>
 
 <file path=ppt/tags/tag58.xml><?xml version="1.0" encoding="utf-8"?>
 <p:tagLst xmlns:a="http://schemas.openxmlformats.org/drawingml/2006/main" xmlns:r="http://schemas.openxmlformats.org/officeDocument/2006/relationships" xmlns:p="http://schemas.openxmlformats.org/presentationml/2006/main">
-  <p:tag name="DVSHAPEID" val="R0w1mGf9L0VwYb2q55mVTX"/>
+  <p:tag name="DVSHAPEID" val="K7ney2pxUt5mZ64FAjSYwd"/>
 </p:tagLst>
 </file>
 
 <file path=ppt/tags/tag59.xml><?xml version="1.0" encoding="utf-8"?>
 <p:tagLst xmlns:a="http://schemas.openxmlformats.org/drawingml/2006/main" xmlns:r="http://schemas.openxmlformats.org/officeDocument/2006/relationships" xmlns:p="http://schemas.openxmlformats.org/presentationml/2006/main">
-  <p:tag name="DVSHAPEID" val="c8hSswppBdvUlaAVXuKqm9"/>
+  <p:tag name="DVSHAPEID" val="8cb7WkbZz8aQPcd3TsniIe"/>
 </p:tagLst>
 </file>
 
@@ -12569,61 +13351,61 @@
 
 <file path=ppt/tags/tag60.xml><?xml version="1.0" encoding="utf-8"?>
 <p:tagLst xmlns:a="http://schemas.openxmlformats.org/drawingml/2006/main" xmlns:r="http://schemas.openxmlformats.org/officeDocument/2006/relationships" xmlns:p="http://schemas.openxmlformats.org/presentationml/2006/main">
-  <p:tag name="DVSECTIONID" val="si0xx0H6oQJPrw0fV8RqEI"/>
+  <p:tag name="DVSECTIONID" val="ulrzQ0fdZzADN4QbpFoSw5"/>
 </p:tagLst>
 </file>
 
 <file path=ppt/tags/tag61.xml><?xml version="1.0" encoding="utf-8"?>
 <p:tagLst xmlns:a="http://schemas.openxmlformats.org/drawingml/2006/main" xmlns:r="http://schemas.openxmlformats.org/officeDocument/2006/relationships" xmlns:p="http://schemas.openxmlformats.org/presentationml/2006/main">
-  <p:tag name="DVSHAPEID" val="Vid20tmiVNkTOoKudIJloH"/>
+  <p:tag name="DVSHAPEID" val="R0w1mGf9L0VwYb2q55mVTX"/>
 </p:tagLst>
 </file>
 
 <file path=ppt/tags/tag62.xml><?xml version="1.0" encoding="utf-8"?>
 <p:tagLst xmlns:a="http://schemas.openxmlformats.org/drawingml/2006/main" xmlns:r="http://schemas.openxmlformats.org/officeDocument/2006/relationships" xmlns:p="http://schemas.openxmlformats.org/presentationml/2006/main">
-  <p:tag name="DVSHAPEID" val="14QRPa7RbtB2dYEpvW2jhI"/>
+  <p:tag name="DVSHAPEID" val="c8hSswppBdvUlaAVXuKqm9"/>
 </p:tagLst>
 </file>
 
 <file path=ppt/tags/tag63.xml><?xml version="1.0" encoding="utf-8"?>
 <p:tagLst xmlns:a="http://schemas.openxmlformats.org/drawingml/2006/main" xmlns:r="http://schemas.openxmlformats.org/officeDocument/2006/relationships" xmlns:p="http://schemas.openxmlformats.org/presentationml/2006/main">
-  <p:tag name="DVSHAPEID" val="zrmcath1G0Kdg8c9Dcb4CR"/>
+  <p:tag name="DVSECTIONID" val="si0xx0H6oQJPrw0fV8RqEI"/>
 </p:tagLst>
 </file>
 
 <file path=ppt/tags/tag64.xml><?xml version="1.0" encoding="utf-8"?>
 <p:tagLst xmlns:a="http://schemas.openxmlformats.org/drawingml/2006/main" xmlns:r="http://schemas.openxmlformats.org/officeDocument/2006/relationships" xmlns:p="http://schemas.openxmlformats.org/presentationml/2006/main">
-  <p:tag name="DVSHAPEID" val="iLaLQOcNj5qjvpvCZDA9MA"/>
+  <p:tag name="DVSHAPEID" val="Vid20tmiVNkTOoKudIJloH"/>
 </p:tagLst>
 </file>
 
 <file path=ppt/tags/tag65.xml><?xml version="1.0" encoding="utf-8"?>
 <p:tagLst xmlns:a="http://schemas.openxmlformats.org/drawingml/2006/main" xmlns:r="http://schemas.openxmlformats.org/officeDocument/2006/relationships" xmlns:p="http://schemas.openxmlformats.org/presentationml/2006/main">
-  <p:tag name="DVSECTIONID" val="0iaJE5WSHD4oT8zisfwTaJ"/>
+  <p:tag name="DVSHAPEID" val="14QRPa7RbtB2dYEpvW2jhI"/>
 </p:tagLst>
 </file>
 
 <file path=ppt/tags/tag66.xml><?xml version="1.0" encoding="utf-8"?>
 <p:tagLst xmlns:a="http://schemas.openxmlformats.org/drawingml/2006/main" xmlns:r="http://schemas.openxmlformats.org/officeDocument/2006/relationships" xmlns:p="http://schemas.openxmlformats.org/presentationml/2006/main">
-  <p:tag name="DVSECTIONID" val="0iaJE5WSHD4oT8zisfwTaJ"/>
+  <p:tag name="DVSHAPEID" val="zrmcath1G0Kdg8c9Dcb4CR"/>
 </p:tagLst>
 </file>
 
 <file path=ppt/tags/tag67.xml><?xml version="1.0" encoding="utf-8"?>
 <p:tagLst xmlns:a="http://schemas.openxmlformats.org/drawingml/2006/main" xmlns:r="http://schemas.openxmlformats.org/officeDocument/2006/relationships" xmlns:p="http://schemas.openxmlformats.org/presentationml/2006/main">
-  <p:tag name="DVSHAPEID" val="i0HwdmiQ8d6H8A1pCsPTHF"/>
+  <p:tag name="DVSECTIONID" val="0iaJE5WSHD4oT8zisfwTaJ"/>
 </p:tagLst>
 </file>
 
 <file path=ppt/tags/tag68.xml><?xml version="1.0" encoding="utf-8"?>
 <p:tagLst xmlns:a="http://schemas.openxmlformats.org/drawingml/2006/main" xmlns:r="http://schemas.openxmlformats.org/officeDocument/2006/relationships" xmlns:p="http://schemas.openxmlformats.org/presentationml/2006/main">
-  <p:tag name="DVSECTIONID" val="kqvciFpyFbEikJbcn77mOg"/>
+  <p:tag name="DVSECTIONID" val="0iaJE5WSHD4oT8zisfwTaJ"/>
 </p:tagLst>
 </file>
 
 <file path=ppt/tags/tag69.xml><?xml version="1.0" encoding="utf-8"?>
 <p:tagLst xmlns:a="http://schemas.openxmlformats.org/drawingml/2006/main" xmlns:r="http://schemas.openxmlformats.org/officeDocument/2006/relationships" xmlns:p="http://schemas.openxmlformats.org/presentationml/2006/main">
-  <p:tag name="DVSHAPEID" val="issGxqE1KUmyP1bgNKSvL6"/>
+  <p:tag name="DVSHAPEID" val="i0HwdmiQ8d6H8A1pCsPTHF"/>
 </p:tagLst>
 </file>
 
@@ -12635,11 +13417,23 @@
 
 <file path=ppt/tags/tag70.xml><?xml version="1.0" encoding="utf-8"?>
 <p:tagLst xmlns:a="http://schemas.openxmlformats.org/drawingml/2006/main" xmlns:r="http://schemas.openxmlformats.org/officeDocument/2006/relationships" xmlns:p="http://schemas.openxmlformats.org/presentationml/2006/main">
+  <p:tag name="DVSECTIONID" val="kqvciFpyFbEikJbcn77mOg"/>
+</p:tagLst>
+</file>
+
+<file path=ppt/tags/tag71.xml><?xml version="1.0" encoding="utf-8"?>
+<p:tagLst xmlns:a="http://schemas.openxmlformats.org/drawingml/2006/main" xmlns:r="http://schemas.openxmlformats.org/officeDocument/2006/relationships" xmlns:p="http://schemas.openxmlformats.org/presentationml/2006/main">
+  <p:tag name="DVSHAPEID" val="issGxqE1KUmyP1bgNKSvL6"/>
+</p:tagLst>
+</file>
+
+<file path=ppt/tags/tag72.xml><?xml version="1.0" encoding="utf-8"?>
+<p:tagLst xmlns:a="http://schemas.openxmlformats.org/drawingml/2006/main" xmlns:r="http://schemas.openxmlformats.org/officeDocument/2006/relationships" xmlns:p="http://schemas.openxmlformats.org/presentationml/2006/main">
   <p:tag name="DVSHAPEID" val="Yry5qPJr1ZPISEOMzwMSbw"/>
 </p:tagLst>
 </file>
 
-<file path=ppt/tags/tag71.xml><?xml version="1.0" encoding="utf-8"?>
+<file path=ppt/tags/tag73.xml><?xml version="1.0" encoding="utf-8"?>
 <p:tagLst xmlns:a="http://schemas.openxmlformats.org/drawingml/2006/main" xmlns:r="http://schemas.openxmlformats.org/officeDocument/2006/relationships" xmlns:p="http://schemas.openxmlformats.org/presentationml/2006/main">
   <p:tag name="DVSHAPEID" val="bXVvCMAYCeCbu18sZOiiTm"/>
 </p:tagLst>

</xml_diff>

<commit_message>
Eliminación Warm Up de CleanCode
</commit_message>
<xml_diff>
--- a/ppt/Diapositivas v2.pptx
+++ b/ppt/Diapositivas v2.pptx
@@ -3904,11 +3904,7 @@
             </a:pPr>
             <a:r>
               <a:rPr lang="es-PE" sz="1200" baseline="0" smtClean="0"/>
-              <a:t>(Opcional) Edici</a:t>
-            </a:r>
-            <a:r>
-              <a:rPr lang="es-PE" sz="1200" baseline="0" smtClean="0"/>
-              <a:t>ón de código</a:t>
+              <a:t>(Opcional) Edición de código</a:t>
             </a:r>
             <a:endParaRPr lang="es-PE" sz="3200" dirty="0" smtClean="0"/>
           </a:p>
@@ -8896,11 +8892,7 @@
           <a:p>
             <a:r>
               <a:rPr lang="es-PE" sz="3200" dirty="0" smtClean="0"/>
-              <a:t>Pr</a:t>
-            </a:r>
-            <a:r>
-              <a:rPr lang="es-PE" sz="3200" dirty="0" smtClean="0"/>
-              <a:t>ácticar previamente solo los refactorings necesarios para el juego.</a:t>
+              <a:t>Prácticar previamente solo los refactorings necesarios para el juego.</a:t>
             </a:r>
           </a:p>
           <a:p>
@@ -8930,15 +8922,7 @@
             </a:pPr>
             <a:r>
               <a:rPr lang="es-PE" sz="3600" dirty="0" smtClean="0"/>
-              <a:t>Discusi</a:t>
-            </a:r>
-            <a:r>
-              <a:rPr lang="es-PE" sz="3600" dirty="0" smtClean="0"/>
-              <a:t>ón</a:t>
-            </a:r>
-            <a:r>
-              <a:rPr lang="es-PE" sz="3600" dirty="0" smtClean="0"/>
-              <a:t> (2 minutos)</a:t>
+              <a:t>Discusión (2 minutos)</a:t>
             </a:r>
           </a:p>
           <a:p>
@@ -8946,7 +8930,6 @@
               <a:rPr lang="es-PE" sz="3200" dirty="0" smtClean="0"/>
               <a:t>Que hemos aprendido de jugar el hoyo.</a:t>
             </a:r>
-            <a:endParaRPr lang="es-PE" sz="3200" dirty="0" smtClean="0"/>
           </a:p>
         </p:txBody>
       </p:sp>
@@ -9831,25 +9814,25 @@
         </p:nvSpPr>
         <p:spPr>
           <a:xfrm>
-            <a:off x="-20748" y="87136"/>
+            <a:off x="-20748" y="116632"/>
             <a:ext cx="9144000" cy="1093136"/>
           </a:xfrm>
         </p:spPr>
         <p:txBody>
           <a:bodyPr>
-            <a:normAutofit fontScale="90000"/>
+            <a:noAutofit/>
           </a:bodyPr>
           <a:lstStyle/>
           <a:p>
             <a:r>
-              <a:rPr lang="es-PE" sz="11500" b="1" spc="300" dirty="0" smtClean="0">
+              <a:rPr lang="es-PE" sz="8800" b="1" spc="300" dirty="0" smtClean="0">
                 <a:solidFill>
                   <a:srgbClr val="FFFFFF"/>
                 </a:solidFill>
               </a:rPr>
-              <a:t>DEMO</a:t>
-            </a:r>
-            <a:endParaRPr lang="es-ES" sz="9600" b="1" spc="300" dirty="0">
+              <a:t>CALENTAMIENTO</a:t>
+            </a:r>
+            <a:endParaRPr lang="es-ES" sz="7200" b="1" spc="300" dirty="0">
               <a:solidFill>
                 <a:srgbClr val="FFFFFF"/>
               </a:solidFill>
@@ -10841,15 +10824,7 @@
             <a:pPr algn="ctr"/>
             <a:r>
               <a:rPr lang="es-PE" sz="3200" dirty="0" smtClean="0"/>
-              <a:t>Es un juego de </a:t>
-            </a:r>
-            <a:r>
-              <a:rPr lang="es-PE" sz="3200" dirty="0" smtClean="0"/>
-              <a:t>4 </a:t>
-            </a:r>
-            <a:r>
-              <a:rPr lang="es-PE" sz="3200" dirty="0" smtClean="0"/>
-              <a:t>hoyos, todos los equipos comenzarán en el tee y en los siguientes hoyos de manera simultanea.</a:t>
+              <a:t>Es un juego de 4 hoyos, todos los equipos comenzarán en el tee y en los siguientes hoyos de manera simultanea.</a:t>
             </a:r>
           </a:p>
         </p:txBody>
@@ -10882,27 +10857,7 @@
             <a:pPr algn="ctr"/>
             <a:r>
               <a:rPr lang="es-PE" sz="3200" dirty="0" smtClean="0"/>
-              <a:t>El tiempo </a:t>
-            </a:r>
-            <a:r>
-              <a:rPr lang="es-PE" sz="3200" dirty="0" smtClean="0"/>
-              <a:t>de ejecuci</a:t>
-            </a:r>
-            <a:r>
-              <a:rPr lang="es-PE" sz="3200" dirty="0" smtClean="0"/>
-              <a:t>ón </a:t>
-            </a:r>
-            <a:r>
-              <a:rPr lang="es-PE" sz="3200" dirty="0" smtClean="0"/>
-              <a:t>por </a:t>
-            </a:r>
-            <a:r>
-              <a:rPr lang="es-PE" sz="3200" dirty="0" smtClean="0"/>
-              <a:t>hoyo es </a:t>
-            </a:r>
-            <a:r>
-              <a:rPr lang="es-PE" sz="3200" dirty="0" smtClean="0"/>
-              <a:t>10 minutos</a:t>
+              <a:t>El tiempo de ejecución por hoyo es 10 minutos</a:t>
             </a:r>
             <a:endParaRPr lang="es-PE" sz="3200" dirty="0"/>
           </a:p>

</xml_diff>